<commit_message>
Commit: PPT and PDF modified
</commit_message>
<xml_diff>
--- a/BalkrishnanV_and_BhavyaK_LendingClubCaseStudy.pptx
+++ b/BalkrishnanV_and_BhavyaK_LendingClubCaseStudy.pptx
@@ -6,9 +6,32 @@
   </p:sldMasterIdLst>
   <p:sldIdLst>
     <p:sldId id="256" r:id="rId2"/>
-    <p:sldId id="257" r:id="rId3"/>
-    <p:sldId id="258" r:id="rId4"/>
-    <p:sldId id="259" r:id="rId5"/>
+    <p:sldId id="261" r:id="rId3"/>
+    <p:sldId id="263" r:id="rId4"/>
+    <p:sldId id="264" r:id="rId5"/>
+    <p:sldId id="265" r:id="rId6"/>
+    <p:sldId id="266" r:id="rId7"/>
+    <p:sldId id="267" r:id="rId8"/>
+    <p:sldId id="268" r:id="rId9"/>
+    <p:sldId id="269" r:id="rId10"/>
+    <p:sldId id="270" r:id="rId11"/>
+    <p:sldId id="271" r:id="rId12"/>
+    <p:sldId id="272" r:id="rId13"/>
+    <p:sldId id="273" r:id="rId14"/>
+    <p:sldId id="274" r:id="rId15"/>
+    <p:sldId id="275" r:id="rId16"/>
+    <p:sldId id="276" r:id="rId17"/>
+    <p:sldId id="277" r:id="rId18"/>
+    <p:sldId id="278" r:id="rId19"/>
+    <p:sldId id="279" r:id="rId20"/>
+    <p:sldId id="280" r:id="rId21"/>
+    <p:sldId id="281" r:id="rId22"/>
+    <p:sldId id="282" r:id="rId23"/>
+    <p:sldId id="283" r:id="rId24"/>
+    <p:sldId id="284" r:id="rId25"/>
+    <p:sldId id="285" r:id="rId26"/>
+    <p:sldId id="286" r:id="rId27"/>
+    <p:sldId id="287" r:id="rId28"/>
   </p:sldIdLst>
   <p:sldSz cx="12192000" cy="6858000"/>
   <p:notesSz cx="6858000" cy="9144000"/>
@@ -107,6 +130,11 @@
       </a:defRPr>
     </a:lvl9pPr>
   </p:defaultTextStyle>
+  <p:extLst>
+    <p:ext uri="{EFAFB233-063F-42B5-8137-9DF3F51BA10A}">
+      <p15:sldGuideLst xmlns:p15="http://schemas.microsoft.com/office/powerpoint/2012/main"/>
+    </p:ext>
+  </p:extLst>
 </p:presentation>
 </file>
 
@@ -319,7 +347,7 @@
           <a:p>
             <a:fld id="{C485584D-7D79-4248-9986-4CA35242F944}" type="datetimeFigureOut">
               <a:rPr lang="en-US" smtClean="0"/>
-              <a:t>10/20/2024</a:t>
+              <a:t>10/23/2024</a:t>
             </a:fld>
             <a:endParaRPr lang="en-US"/>
           </a:p>
@@ -693,7 +721,7 @@
           <a:p>
             <a:fld id="{C485584D-7D79-4248-9986-4CA35242F944}" type="datetimeFigureOut">
               <a:rPr lang="en-US" smtClean="0"/>
-              <a:t>10/20/2024</a:t>
+              <a:t>10/23/2024</a:t>
             </a:fld>
             <a:endParaRPr lang="en-US"/>
           </a:p>
@@ -903,7 +931,7 @@
           <a:p>
             <a:fld id="{C485584D-7D79-4248-9986-4CA35242F944}" type="datetimeFigureOut">
               <a:rPr lang="en-US" smtClean="0"/>
-              <a:t>10/20/2024</a:t>
+              <a:t>10/23/2024</a:t>
             </a:fld>
             <a:endParaRPr lang="en-US"/>
           </a:p>
@@ -1102,7 +1130,7 @@
           <a:p>
             <a:fld id="{C485584D-7D79-4248-9986-4CA35242F944}" type="datetimeFigureOut">
               <a:rPr lang="en-US" smtClean="0"/>
-              <a:t>10/20/2024</a:t>
+              <a:t>10/23/2024</a:t>
             </a:fld>
             <a:endParaRPr lang="en-US"/>
           </a:p>
@@ -1215,7 +1243,7 @@
           <a:p>
             <a:fld id="{C485584D-7D79-4248-9986-4CA35242F944}" type="datetimeFigureOut">
               <a:rPr lang="en-US" smtClean="0"/>
-              <a:t>10/20/2024</a:t>
+              <a:t>10/23/2024</a:t>
             </a:fld>
             <a:endParaRPr lang="en-US"/>
           </a:p>
@@ -1951,7 +1979,7 @@
           <a:p>
             <a:fld id="{C485584D-7D79-4248-9986-4CA35242F944}" type="datetimeFigureOut">
               <a:rPr lang="en-US" smtClean="0"/>
-              <a:t>10/20/2024</a:t>
+              <a:t>10/23/2024</a:t>
             </a:fld>
             <a:endParaRPr lang="en-US"/>
           </a:p>
@@ -2367,7 +2395,7 @@
           <a:p>
             <a:fld id="{C485584D-7D79-4248-9986-4CA35242F944}" type="datetimeFigureOut">
               <a:rPr lang="en-US" smtClean="0"/>
-              <a:t>10/20/2024</a:t>
+              <a:t>10/23/2024</a:t>
             </a:fld>
             <a:endParaRPr lang="en-US"/>
           </a:p>
@@ -2508,7 +2536,7 @@
           <a:p>
             <a:fld id="{C485584D-7D79-4248-9986-4CA35242F944}" type="datetimeFigureOut">
               <a:rPr lang="en-US" smtClean="0"/>
-              <a:t>10/20/2024</a:t>
+              <a:t>10/23/2024</a:t>
             </a:fld>
             <a:endParaRPr lang="en-US"/>
           </a:p>
@@ -2621,7 +2649,7 @@
           <a:p>
             <a:fld id="{C485584D-7D79-4248-9986-4CA35242F944}" type="datetimeFigureOut">
               <a:rPr lang="en-US" smtClean="0"/>
-              <a:t>10/20/2024</a:t>
+              <a:t>10/23/2024</a:t>
             </a:fld>
             <a:endParaRPr lang="en-US"/>
           </a:p>
@@ -2934,7 +2962,7 @@
           <a:p>
             <a:fld id="{C485584D-7D79-4248-9986-4CA35242F944}" type="datetimeFigureOut">
               <a:rPr lang="en-US" smtClean="0"/>
-              <a:t>10/20/2024</a:t>
+              <a:t>10/23/2024</a:t>
             </a:fld>
             <a:endParaRPr lang="en-US"/>
           </a:p>
@@ -3226,7 +3254,7 @@
           <a:p>
             <a:fld id="{C485584D-7D79-4248-9986-4CA35242F944}" type="datetimeFigureOut">
               <a:rPr lang="en-US" smtClean="0"/>
-              <a:t>10/20/2024</a:t>
+              <a:t>10/23/2024</a:t>
             </a:fld>
             <a:endParaRPr lang="en-US"/>
           </a:p>
@@ -3510,7 +3538,7 @@
           <a:p>
             <a:fld id="{C485584D-7D79-4248-9986-4CA35242F944}" type="datetimeFigureOut">
               <a:rPr lang="en-US" smtClean="0"/>
-              <a:t>10/20/2024</a:t>
+              <a:t>10/23/2024</a:t>
             </a:fld>
             <a:endParaRPr lang="en-US"/>
           </a:p>
@@ -4512,7 +4540,7 @@
 </p:sld>
 </file>
 
-<file path=ppt/slides/slide2.xml><?xml version="1.0" encoding="utf-8"?>
+<file path=ppt/slides/slide10.xml><?xml version="1.0" encoding="utf-8"?>
 <p:sld xmlns:a="http://schemas.openxmlformats.org/drawingml/2006/main" xmlns:r="http://schemas.openxmlformats.org/officeDocument/2006/relationships" xmlns:p="http://schemas.openxmlformats.org/presentationml/2006/main">
   <p:cSld>
     <p:spTree>
@@ -4534,7 +4562,7 @@
           <p:cNvPr id="2" name="Title 1">
             <a:extLst>
               <a:ext uri="{FF2B5EF4-FFF2-40B4-BE49-F238E27FC236}">
-                <a16:creationId xmlns:a16="http://schemas.microsoft.com/office/drawing/2014/main" id="{BFDA263C-B850-489E-B133-6353584B88D8}"/>
+                <a16:creationId xmlns:a16="http://schemas.microsoft.com/office/drawing/2014/main" id="{D5A31E08-DFB8-8419-DA11-4FDD0BAD36A9}"/>
               </a:ext>
             </a:extLst>
           </p:cNvPr>
@@ -4545,44 +4573,2135 @@
             <p:ph type="title"/>
           </p:nvPr>
         </p:nvSpPr>
-        <p:spPr/>
-        <p:txBody>
-          <a:bodyPr/>
-          <a:lstStyle/>
-          <a:p>
-            <a:endParaRPr lang="en-IN"/>
-          </a:p>
-        </p:txBody>
-      </p:sp>
-      <p:sp>
-        <p:nvSpPr>
-          <p:cNvPr id="3" name="Content Placeholder 2">
-            <a:extLst>
-              <a:ext uri="{FF2B5EF4-FFF2-40B4-BE49-F238E27FC236}">
-                <a16:creationId xmlns:a16="http://schemas.microsoft.com/office/drawing/2014/main" id="{68D4B787-13F0-4459-6C2E-0BC71A37A38F}"/>
-              </a:ext>
-            </a:extLst>
-          </p:cNvPr>
-          <p:cNvSpPr>
-            <a:spLocks noGrp="1"/>
-          </p:cNvSpPr>
-          <p:nvPr>
-            <p:ph idx="1"/>
-          </p:nvPr>
-        </p:nvSpPr>
-        <p:spPr/>
-        <p:txBody>
-          <a:bodyPr/>
-          <a:lstStyle/>
-          <a:p>
-            <a:endParaRPr lang="en-IN"/>
-          </a:p>
-        </p:txBody>
-      </p:sp>
+        <p:spPr>
+          <a:xfrm>
+            <a:off x="1824111" y="723900"/>
+            <a:ext cx="8543779" cy="446557"/>
+          </a:xfrm>
+        </p:spPr>
+        <p:txBody>
+          <a:bodyPr anchor="b">
+            <a:normAutofit fontScale="90000"/>
+          </a:bodyPr>
+          <a:lstStyle/>
+          <a:p>
+            <a:pPr algn="ctr"/>
+            <a:endParaRPr lang="en-IN" dirty="0"/>
+          </a:p>
+        </p:txBody>
+      </p:sp>
+      <p:pic>
+        <p:nvPicPr>
+          <p:cNvPr id="5" name="Picture 4">
+            <a:extLst>
+              <a:ext uri="{FF2B5EF4-FFF2-40B4-BE49-F238E27FC236}">
+                <a16:creationId xmlns:a16="http://schemas.microsoft.com/office/drawing/2014/main" id="{C37AA331-EF66-9804-E155-4805CD75AC4E}"/>
+              </a:ext>
+            </a:extLst>
+          </p:cNvPr>
+          <p:cNvPicPr>
+            <a:picLocks noChangeAspect="1"/>
+          </p:cNvPicPr>
+          <p:nvPr/>
+        </p:nvPicPr>
+        <p:blipFill>
+          <a:blip r:embed="rId2"/>
+          <a:stretch>
+            <a:fillRect/>
+          </a:stretch>
+        </p:blipFill>
+        <p:spPr>
+          <a:xfrm>
+            <a:off x="195675" y="1581047"/>
+            <a:ext cx="11800650" cy="4438454"/>
+          </a:xfrm>
+          <a:prstGeom prst="rect">
+            <a:avLst/>
+          </a:prstGeom>
+        </p:spPr>
+      </p:pic>
     </p:spTree>
     <p:extLst>
       <p:ext uri="{BB962C8B-B14F-4D97-AF65-F5344CB8AC3E}">
-        <p14:creationId xmlns:p14="http://schemas.microsoft.com/office/powerpoint/2010/main" val="3987541855"/>
+        <p14:creationId xmlns:p14="http://schemas.microsoft.com/office/powerpoint/2010/main" val="1645858227"/>
+      </p:ext>
+    </p:extLst>
+  </p:cSld>
+  <p:clrMapOvr>
+    <a:masterClrMapping/>
+  </p:clrMapOvr>
+</p:sld>
+</file>
+
+<file path=ppt/slides/slide11.xml><?xml version="1.0" encoding="utf-8"?>
+<p:sld xmlns:a="http://schemas.openxmlformats.org/drawingml/2006/main" xmlns:r="http://schemas.openxmlformats.org/officeDocument/2006/relationships" xmlns:p="http://schemas.openxmlformats.org/presentationml/2006/main">
+  <p:cSld>
+    <p:spTree>
+      <p:nvGrpSpPr>
+        <p:cNvPr id="1" name=""/>
+        <p:cNvGrpSpPr/>
+        <p:nvPr/>
+      </p:nvGrpSpPr>
+      <p:grpSpPr>
+        <a:xfrm>
+          <a:off x="0" y="0"/>
+          <a:ext cx="0" cy="0"/>
+          <a:chOff x="0" y="0"/>
+          <a:chExt cx="0" cy="0"/>
+        </a:xfrm>
+      </p:grpSpPr>
+      <p:sp>
+        <p:nvSpPr>
+          <p:cNvPr id="2" name="Title 1">
+            <a:extLst>
+              <a:ext uri="{FF2B5EF4-FFF2-40B4-BE49-F238E27FC236}">
+                <a16:creationId xmlns:a16="http://schemas.microsoft.com/office/drawing/2014/main" id="{D5A31E08-DFB8-8419-DA11-4FDD0BAD36A9}"/>
+              </a:ext>
+            </a:extLst>
+          </p:cNvPr>
+          <p:cNvSpPr>
+            <a:spLocks noGrp="1"/>
+          </p:cNvSpPr>
+          <p:nvPr>
+            <p:ph type="title"/>
+          </p:nvPr>
+        </p:nvSpPr>
+        <p:spPr>
+          <a:xfrm>
+            <a:off x="1824111" y="723900"/>
+            <a:ext cx="8543779" cy="446557"/>
+          </a:xfrm>
+        </p:spPr>
+        <p:txBody>
+          <a:bodyPr anchor="b">
+            <a:normAutofit fontScale="90000"/>
+          </a:bodyPr>
+          <a:lstStyle/>
+          <a:p>
+            <a:pPr algn="ctr"/>
+            <a:endParaRPr lang="en-IN" dirty="0"/>
+          </a:p>
+        </p:txBody>
+      </p:sp>
+      <p:pic>
+        <p:nvPicPr>
+          <p:cNvPr id="5" name="Picture 4">
+            <a:extLst>
+              <a:ext uri="{FF2B5EF4-FFF2-40B4-BE49-F238E27FC236}">
+                <a16:creationId xmlns:a16="http://schemas.microsoft.com/office/drawing/2014/main" id="{11921ED7-ABE2-D3C2-0014-C72E0527A0F4}"/>
+              </a:ext>
+            </a:extLst>
+          </p:cNvPr>
+          <p:cNvPicPr>
+            <a:picLocks noChangeAspect="1"/>
+          </p:cNvPicPr>
+          <p:nvPr/>
+        </p:nvPicPr>
+        <p:blipFill>
+          <a:blip r:embed="rId2"/>
+          <a:stretch>
+            <a:fillRect/>
+          </a:stretch>
+        </p:blipFill>
+        <p:spPr>
+          <a:xfrm>
+            <a:off x="2645229" y="1644585"/>
+            <a:ext cx="6281057" cy="4311388"/>
+          </a:xfrm>
+          <a:prstGeom prst="rect">
+            <a:avLst/>
+          </a:prstGeom>
+        </p:spPr>
+      </p:pic>
+    </p:spTree>
+    <p:extLst>
+      <p:ext uri="{BB962C8B-B14F-4D97-AF65-F5344CB8AC3E}">
+        <p14:creationId xmlns:p14="http://schemas.microsoft.com/office/powerpoint/2010/main" val="2009776216"/>
+      </p:ext>
+    </p:extLst>
+  </p:cSld>
+  <p:clrMapOvr>
+    <a:masterClrMapping/>
+  </p:clrMapOvr>
+</p:sld>
+</file>
+
+<file path=ppt/slides/slide12.xml><?xml version="1.0" encoding="utf-8"?>
+<p:sld xmlns:a="http://schemas.openxmlformats.org/drawingml/2006/main" xmlns:r="http://schemas.openxmlformats.org/officeDocument/2006/relationships" xmlns:p="http://schemas.openxmlformats.org/presentationml/2006/main">
+  <p:cSld>
+    <p:spTree>
+      <p:nvGrpSpPr>
+        <p:cNvPr id="1" name=""/>
+        <p:cNvGrpSpPr/>
+        <p:nvPr/>
+      </p:nvGrpSpPr>
+      <p:grpSpPr>
+        <a:xfrm>
+          <a:off x="0" y="0"/>
+          <a:ext cx="0" cy="0"/>
+          <a:chOff x="0" y="0"/>
+          <a:chExt cx="0" cy="0"/>
+        </a:xfrm>
+      </p:grpSpPr>
+      <p:sp>
+        <p:nvSpPr>
+          <p:cNvPr id="2" name="Title 1">
+            <a:extLst>
+              <a:ext uri="{FF2B5EF4-FFF2-40B4-BE49-F238E27FC236}">
+                <a16:creationId xmlns:a16="http://schemas.microsoft.com/office/drawing/2014/main" id="{D5A31E08-DFB8-8419-DA11-4FDD0BAD36A9}"/>
+              </a:ext>
+            </a:extLst>
+          </p:cNvPr>
+          <p:cNvSpPr>
+            <a:spLocks noGrp="1"/>
+          </p:cNvSpPr>
+          <p:nvPr>
+            <p:ph type="title"/>
+          </p:nvPr>
+        </p:nvSpPr>
+        <p:spPr>
+          <a:xfrm>
+            <a:off x="1824111" y="723900"/>
+            <a:ext cx="8543779" cy="446557"/>
+          </a:xfrm>
+        </p:spPr>
+        <p:txBody>
+          <a:bodyPr anchor="b">
+            <a:normAutofit fontScale="90000"/>
+          </a:bodyPr>
+          <a:lstStyle/>
+          <a:p>
+            <a:pPr algn="ctr"/>
+            <a:endParaRPr lang="en-IN" dirty="0"/>
+          </a:p>
+        </p:txBody>
+      </p:sp>
+      <p:pic>
+        <p:nvPicPr>
+          <p:cNvPr id="5" name="Picture 4">
+            <a:extLst>
+              <a:ext uri="{FF2B5EF4-FFF2-40B4-BE49-F238E27FC236}">
+                <a16:creationId xmlns:a16="http://schemas.microsoft.com/office/drawing/2014/main" id="{3F6C521B-A399-04A6-C029-038BA37FD5F4}"/>
+              </a:ext>
+            </a:extLst>
+          </p:cNvPr>
+          <p:cNvPicPr>
+            <a:picLocks noChangeAspect="1"/>
+          </p:cNvPicPr>
+          <p:nvPr/>
+        </p:nvPicPr>
+        <p:blipFill>
+          <a:blip r:embed="rId2"/>
+          <a:stretch>
+            <a:fillRect/>
+          </a:stretch>
+        </p:blipFill>
+        <p:spPr>
+          <a:xfrm>
+            <a:off x="2876706" y="1537087"/>
+            <a:ext cx="6438587" cy="4460942"/>
+          </a:xfrm>
+          <a:prstGeom prst="rect">
+            <a:avLst/>
+          </a:prstGeom>
+        </p:spPr>
+      </p:pic>
+    </p:spTree>
+    <p:extLst>
+      <p:ext uri="{BB962C8B-B14F-4D97-AF65-F5344CB8AC3E}">
+        <p14:creationId xmlns:p14="http://schemas.microsoft.com/office/powerpoint/2010/main" val="3068921739"/>
+      </p:ext>
+    </p:extLst>
+  </p:cSld>
+  <p:clrMapOvr>
+    <a:masterClrMapping/>
+  </p:clrMapOvr>
+</p:sld>
+</file>
+
+<file path=ppt/slides/slide13.xml><?xml version="1.0" encoding="utf-8"?>
+<p:sld xmlns:a="http://schemas.openxmlformats.org/drawingml/2006/main" xmlns:r="http://schemas.openxmlformats.org/officeDocument/2006/relationships" xmlns:p="http://schemas.openxmlformats.org/presentationml/2006/main">
+  <p:cSld>
+    <p:spTree>
+      <p:nvGrpSpPr>
+        <p:cNvPr id="1" name=""/>
+        <p:cNvGrpSpPr/>
+        <p:nvPr/>
+      </p:nvGrpSpPr>
+      <p:grpSpPr>
+        <a:xfrm>
+          <a:off x="0" y="0"/>
+          <a:ext cx="0" cy="0"/>
+          <a:chOff x="0" y="0"/>
+          <a:chExt cx="0" cy="0"/>
+        </a:xfrm>
+      </p:grpSpPr>
+      <p:sp>
+        <p:nvSpPr>
+          <p:cNvPr id="2" name="Title 1">
+            <a:extLst>
+              <a:ext uri="{FF2B5EF4-FFF2-40B4-BE49-F238E27FC236}">
+                <a16:creationId xmlns:a16="http://schemas.microsoft.com/office/drawing/2014/main" id="{D5A31E08-DFB8-8419-DA11-4FDD0BAD36A9}"/>
+              </a:ext>
+            </a:extLst>
+          </p:cNvPr>
+          <p:cNvSpPr>
+            <a:spLocks noGrp="1"/>
+          </p:cNvSpPr>
+          <p:nvPr>
+            <p:ph type="title"/>
+          </p:nvPr>
+        </p:nvSpPr>
+        <p:spPr>
+          <a:xfrm>
+            <a:off x="1824111" y="723900"/>
+            <a:ext cx="8543779" cy="446557"/>
+          </a:xfrm>
+        </p:spPr>
+        <p:txBody>
+          <a:bodyPr anchor="b">
+            <a:normAutofit fontScale="90000"/>
+          </a:bodyPr>
+          <a:lstStyle/>
+          <a:p>
+            <a:pPr algn="ctr"/>
+            <a:endParaRPr lang="en-IN" dirty="0"/>
+          </a:p>
+        </p:txBody>
+      </p:sp>
+      <p:pic>
+        <p:nvPicPr>
+          <p:cNvPr id="5" name="Picture 4">
+            <a:extLst>
+              <a:ext uri="{FF2B5EF4-FFF2-40B4-BE49-F238E27FC236}">
+                <a16:creationId xmlns:a16="http://schemas.microsoft.com/office/drawing/2014/main" id="{75EB2938-A326-B737-F8B7-79E647F1DB30}"/>
+              </a:ext>
+            </a:extLst>
+          </p:cNvPr>
+          <p:cNvPicPr>
+            <a:picLocks noChangeAspect="1"/>
+          </p:cNvPicPr>
+          <p:nvPr/>
+        </p:nvPicPr>
+        <p:blipFill>
+          <a:blip r:embed="rId2"/>
+          <a:stretch>
+            <a:fillRect/>
+          </a:stretch>
+        </p:blipFill>
+        <p:spPr>
+          <a:xfrm>
+            <a:off x="3511048" y="1432285"/>
+            <a:ext cx="5169903" cy="5064035"/>
+          </a:xfrm>
+          <a:prstGeom prst="rect">
+            <a:avLst/>
+          </a:prstGeom>
+        </p:spPr>
+      </p:pic>
+    </p:spTree>
+    <p:extLst>
+      <p:ext uri="{BB962C8B-B14F-4D97-AF65-F5344CB8AC3E}">
+        <p14:creationId xmlns:p14="http://schemas.microsoft.com/office/powerpoint/2010/main" val="1583639051"/>
+      </p:ext>
+    </p:extLst>
+  </p:cSld>
+  <p:clrMapOvr>
+    <a:masterClrMapping/>
+  </p:clrMapOvr>
+</p:sld>
+</file>
+
+<file path=ppt/slides/slide14.xml><?xml version="1.0" encoding="utf-8"?>
+<p:sld xmlns:a="http://schemas.openxmlformats.org/drawingml/2006/main" xmlns:r="http://schemas.openxmlformats.org/officeDocument/2006/relationships" xmlns:p="http://schemas.openxmlformats.org/presentationml/2006/main">
+  <p:cSld>
+    <p:spTree>
+      <p:nvGrpSpPr>
+        <p:cNvPr id="1" name=""/>
+        <p:cNvGrpSpPr/>
+        <p:nvPr/>
+      </p:nvGrpSpPr>
+      <p:grpSpPr>
+        <a:xfrm>
+          <a:off x="0" y="0"/>
+          <a:ext cx="0" cy="0"/>
+          <a:chOff x="0" y="0"/>
+          <a:chExt cx="0" cy="0"/>
+        </a:xfrm>
+      </p:grpSpPr>
+      <p:sp>
+        <p:nvSpPr>
+          <p:cNvPr id="2" name="Title 1">
+            <a:extLst>
+              <a:ext uri="{FF2B5EF4-FFF2-40B4-BE49-F238E27FC236}">
+                <a16:creationId xmlns:a16="http://schemas.microsoft.com/office/drawing/2014/main" id="{D5A31E08-DFB8-8419-DA11-4FDD0BAD36A9}"/>
+              </a:ext>
+            </a:extLst>
+          </p:cNvPr>
+          <p:cNvSpPr>
+            <a:spLocks noGrp="1"/>
+          </p:cNvSpPr>
+          <p:nvPr>
+            <p:ph type="title"/>
+          </p:nvPr>
+        </p:nvSpPr>
+        <p:spPr>
+          <a:xfrm>
+            <a:off x="1824111" y="723900"/>
+            <a:ext cx="8543779" cy="446557"/>
+          </a:xfrm>
+        </p:spPr>
+        <p:txBody>
+          <a:bodyPr anchor="b">
+            <a:normAutofit fontScale="90000"/>
+          </a:bodyPr>
+          <a:lstStyle/>
+          <a:p>
+            <a:pPr algn="ctr"/>
+            <a:endParaRPr lang="en-IN" dirty="0"/>
+          </a:p>
+        </p:txBody>
+      </p:sp>
+      <p:pic>
+        <p:nvPicPr>
+          <p:cNvPr id="5" name="Picture 4">
+            <a:extLst>
+              <a:ext uri="{FF2B5EF4-FFF2-40B4-BE49-F238E27FC236}">
+                <a16:creationId xmlns:a16="http://schemas.microsoft.com/office/drawing/2014/main" id="{364DFA72-A750-62F3-B6D8-924010DF489C}"/>
+              </a:ext>
+            </a:extLst>
+          </p:cNvPr>
+          <p:cNvPicPr>
+            <a:picLocks noChangeAspect="1"/>
+          </p:cNvPicPr>
+          <p:nvPr/>
+        </p:nvPicPr>
+        <p:blipFill>
+          <a:blip r:embed="rId2"/>
+          <a:stretch>
+            <a:fillRect/>
+          </a:stretch>
+        </p:blipFill>
+        <p:spPr>
+          <a:xfrm>
+            <a:off x="3556177" y="1275791"/>
+            <a:ext cx="5079646" cy="5313193"/>
+          </a:xfrm>
+          <a:prstGeom prst="rect">
+            <a:avLst/>
+          </a:prstGeom>
+        </p:spPr>
+      </p:pic>
+    </p:spTree>
+    <p:extLst>
+      <p:ext uri="{BB962C8B-B14F-4D97-AF65-F5344CB8AC3E}">
+        <p14:creationId xmlns:p14="http://schemas.microsoft.com/office/powerpoint/2010/main" val="472816947"/>
+      </p:ext>
+    </p:extLst>
+  </p:cSld>
+  <p:clrMapOvr>
+    <a:masterClrMapping/>
+  </p:clrMapOvr>
+</p:sld>
+</file>
+
+<file path=ppt/slides/slide15.xml><?xml version="1.0" encoding="utf-8"?>
+<p:sld xmlns:a="http://schemas.openxmlformats.org/drawingml/2006/main" xmlns:r="http://schemas.openxmlformats.org/officeDocument/2006/relationships" xmlns:p="http://schemas.openxmlformats.org/presentationml/2006/main">
+  <p:cSld>
+    <p:spTree>
+      <p:nvGrpSpPr>
+        <p:cNvPr id="1" name=""/>
+        <p:cNvGrpSpPr/>
+        <p:nvPr/>
+      </p:nvGrpSpPr>
+      <p:grpSpPr>
+        <a:xfrm>
+          <a:off x="0" y="0"/>
+          <a:ext cx="0" cy="0"/>
+          <a:chOff x="0" y="0"/>
+          <a:chExt cx="0" cy="0"/>
+        </a:xfrm>
+      </p:grpSpPr>
+      <p:sp>
+        <p:nvSpPr>
+          <p:cNvPr id="2" name="Title 1">
+            <a:extLst>
+              <a:ext uri="{FF2B5EF4-FFF2-40B4-BE49-F238E27FC236}">
+                <a16:creationId xmlns:a16="http://schemas.microsoft.com/office/drawing/2014/main" id="{D5A31E08-DFB8-8419-DA11-4FDD0BAD36A9}"/>
+              </a:ext>
+            </a:extLst>
+          </p:cNvPr>
+          <p:cNvSpPr>
+            <a:spLocks noGrp="1"/>
+          </p:cNvSpPr>
+          <p:nvPr>
+            <p:ph type="title"/>
+          </p:nvPr>
+        </p:nvSpPr>
+        <p:spPr>
+          <a:xfrm>
+            <a:off x="1824111" y="723900"/>
+            <a:ext cx="8543779" cy="446557"/>
+          </a:xfrm>
+        </p:spPr>
+        <p:txBody>
+          <a:bodyPr anchor="b">
+            <a:normAutofit fontScale="90000"/>
+          </a:bodyPr>
+          <a:lstStyle/>
+          <a:p>
+            <a:pPr algn="ctr"/>
+            <a:endParaRPr lang="en-IN" dirty="0"/>
+          </a:p>
+        </p:txBody>
+      </p:sp>
+      <p:pic>
+        <p:nvPicPr>
+          <p:cNvPr id="7" name="Picture 6">
+            <a:extLst>
+              <a:ext uri="{FF2B5EF4-FFF2-40B4-BE49-F238E27FC236}">
+                <a16:creationId xmlns:a16="http://schemas.microsoft.com/office/drawing/2014/main" id="{F5734A28-5808-4B0C-0EE7-566417280725}"/>
+              </a:ext>
+            </a:extLst>
+          </p:cNvPr>
+          <p:cNvPicPr>
+            <a:picLocks noChangeAspect="1"/>
+          </p:cNvPicPr>
+          <p:nvPr/>
+        </p:nvPicPr>
+        <p:blipFill>
+          <a:blip r:embed="rId2"/>
+          <a:stretch>
+            <a:fillRect/>
+          </a:stretch>
+        </p:blipFill>
+        <p:spPr>
+          <a:xfrm>
+            <a:off x="3519134" y="1591101"/>
+            <a:ext cx="5153732" cy="4356762"/>
+          </a:xfrm>
+          <a:prstGeom prst="rect">
+            <a:avLst/>
+          </a:prstGeom>
+        </p:spPr>
+      </p:pic>
+    </p:spTree>
+    <p:extLst>
+      <p:ext uri="{BB962C8B-B14F-4D97-AF65-F5344CB8AC3E}">
+        <p14:creationId xmlns:p14="http://schemas.microsoft.com/office/powerpoint/2010/main" val="3631508563"/>
+      </p:ext>
+    </p:extLst>
+  </p:cSld>
+  <p:clrMapOvr>
+    <a:masterClrMapping/>
+  </p:clrMapOvr>
+</p:sld>
+</file>
+
+<file path=ppt/slides/slide16.xml><?xml version="1.0" encoding="utf-8"?>
+<p:sld xmlns:a="http://schemas.openxmlformats.org/drawingml/2006/main" xmlns:r="http://schemas.openxmlformats.org/officeDocument/2006/relationships" xmlns:p="http://schemas.openxmlformats.org/presentationml/2006/main">
+  <p:cSld>
+    <p:spTree>
+      <p:nvGrpSpPr>
+        <p:cNvPr id="1" name=""/>
+        <p:cNvGrpSpPr/>
+        <p:nvPr/>
+      </p:nvGrpSpPr>
+      <p:grpSpPr>
+        <a:xfrm>
+          <a:off x="0" y="0"/>
+          <a:ext cx="0" cy="0"/>
+          <a:chOff x="0" y="0"/>
+          <a:chExt cx="0" cy="0"/>
+        </a:xfrm>
+      </p:grpSpPr>
+      <p:sp>
+        <p:nvSpPr>
+          <p:cNvPr id="2" name="Title 1">
+            <a:extLst>
+              <a:ext uri="{FF2B5EF4-FFF2-40B4-BE49-F238E27FC236}">
+                <a16:creationId xmlns:a16="http://schemas.microsoft.com/office/drawing/2014/main" id="{D5A31E08-DFB8-8419-DA11-4FDD0BAD36A9}"/>
+              </a:ext>
+            </a:extLst>
+          </p:cNvPr>
+          <p:cNvSpPr>
+            <a:spLocks noGrp="1"/>
+          </p:cNvSpPr>
+          <p:nvPr>
+            <p:ph type="title"/>
+          </p:nvPr>
+        </p:nvSpPr>
+        <p:spPr>
+          <a:xfrm>
+            <a:off x="1824111" y="723900"/>
+            <a:ext cx="8543779" cy="446557"/>
+          </a:xfrm>
+        </p:spPr>
+        <p:txBody>
+          <a:bodyPr anchor="b">
+            <a:normAutofit fontScale="90000"/>
+          </a:bodyPr>
+          <a:lstStyle/>
+          <a:p>
+            <a:pPr algn="ctr"/>
+            <a:endParaRPr lang="en-IN" dirty="0"/>
+          </a:p>
+        </p:txBody>
+      </p:sp>
+      <p:pic>
+        <p:nvPicPr>
+          <p:cNvPr id="5" name="Picture 4">
+            <a:extLst>
+              <a:ext uri="{FF2B5EF4-FFF2-40B4-BE49-F238E27FC236}">
+                <a16:creationId xmlns:a16="http://schemas.microsoft.com/office/drawing/2014/main" id="{B7C0C07F-8877-B3E9-8496-D6DD43AC1777}"/>
+              </a:ext>
+            </a:extLst>
+          </p:cNvPr>
+          <p:cNvPicPr>
+            <a:picLocks noChangeAspect="1"/>
+          </p:cNvPicPr>
+          <p:nvPr/>
+        </p:nvPicPr>
+        <p:blipFill>
+          <a:blip r:embed="rId2"/>
+          <a:stretch>
+            <a:fillRect/>
+          </a:stretch>
+        </p:blipFill>
+        <p:spPr>
+          <a:xfrm>
+            <a:off x="2582583" y="1782231"/>
+            <a:ext cx="7026833" cy="4176324"/>
+          </a:xfrm>
+          <a:prstGeom prst="rect">
+            <a:avLst/>
+          </a:prstGeom>
+        </p:spPr>
+      </p:pic>
+    </p:spTree>
+    <p:extLst>
+      <p:ext uri="{BB962C8B-B14F-4D97-AF65-F5344CB8AC3E}">
+        <p14:creationId xmlns:p14="http://schemas.microsoft.com/office/powerpoint/2010/main" val="3417914379"/>
+      </p:ext>
+    </p:extLst>
+  </p:cSld>
+  <p:clrMapOvr>
+    <a:masterClrMapping/>
+  </p:clrMapOvr>
+</p:sld>
+</file>
+
+<file path=ppt/slides/slide17.xml><?xml version="1.0" encoding="utf-8"?>
+<p:sld xmlns:a="http://schemas.openxmlformats.org/drawingml/2006/main" xmlns:r="http://schemas.openxmlformats.org/officeDocument/2006/relationships" xmlns:p="http://schemas.openxmlformats.org/presentationml/2006/main">
+  <p:cSld>
+    <p:spTree>
+      <p:nvGrpSpPr>
+        <p:cNvPr id="1" name=""/>
+        <p:cNvGrpSpPr/>
+        <p:nvPr/>
+      </p:nvGrpSpPr>
+      <p:grpSpPr>
+        <a:xfrm>
+          <a:off x="0" y="0"/>
+          <a:ext cx="0" cy="0"/>
+          <a:chOff x="0" y="0"/>
+          <a:chExt cx="0" cy="0"/>
+        </a:xfrm>
+      </p:grpSpPr>
+      <p:sp>
+        <p:nvSpPr>
+          <p:cNvPr id="2" name="Title 1">
+            <a:extLst>
+              <a:ext uri="{FF2B5EF4-FFF2-40B4-BE49-F238E27FC236}">
+                <a16:creationId xmlns:a16="http://schemas.microsoft.com/office/drawing/2014/main" id="{D5A31E08-DFB8-8419-DA11-4FDD0BAD36A9}"/>
+              </a:ext>
+            </a:extLst>
+          </p:cNvPr>
+          <p:cNvSpPr>
+            <a:spLocks noGrp="1"/>
+          </p:cNvSpPr>
+          <p:nvPr>
+            <p:ph type="title"/>
+          </p:nvPr>
+        </p:nvSpPr>
+        <p:spPr>
+          <a:xfrm>
+            <a:off x="1824111" y="723900"/>
+            <a:ext cx="8543779" cy="446557"/>
+          </a:xfrm>
+        </p:spPr>
+        <p:txBody>
+          <a:bodyPr anchor="b">
+            <a:normAutofit fontScale="90000"/>
+          </a:bodyPr>
+          <a:lstStyle/>
+          <a:p>
+            <a:pPr algn="ctr"/>
+            <a:endParaRPr lang="en-IN" dirty="0"/>
+          </a:p>
+        </p:txBody>
+      </p:sp>
+      <p:pic>
+        <p:nvPicPr>
+          <p:cNvPr id="5" name="Picture 4">
+            <a:extLst>
+              <a:ext uri="{FF2B5EF4-FFF2-40B4-BE49-F238E27FC236}">
+                <a16:creationId xmlns:a16="http://schemas.microsoft.com/office/drawing/2014/main" id="{A8047F44-34A8-600A-36ED-634DACF94FDD}"/>
+              </a:ext>
+            </a:extLst>
+          </p:cNvPr>
+          <p:cNvPicPr>
+            <a:picLocks noChangeAspect="1"/>
+          </p:cNvPicPr>
+          <p:nvPr/>
+        </p:nvPicPr>
+        <p:blipFill>
+          <a:blip r:embed="rId2"/>
+          <a:stretch>
+            <a:fillRect/>
+          </a:stretch>
+        </p:blipFill>
+        <p:spPr>
+          <a:xfrm>
+            <a:off x="2296887" y="1771208"/>
+            <a:ext cx="7097485" cy="4136503"/>
+          </a:xfrm>
+          <a:prstGeom prst="rect">
+            <a:avLst/>
+          </a:prstGeom>
+        </p:spPr>
+      </p:pic>
+    </p:spTree>
+    <p:extLst>
+      <p:ext uri="{BB962C8B-B14F-4D97-AF65-F5344CB8AC3E}">
+        <p14:creationId xmlns:p14="http://schemas.microsoft.com/office/powerpoint/2010/main" val="3798109187"/>
+      </p:ext>
+    </p:extLst>
+  </p:cSld>
+  <p:clrMapOvr>
+    <a:masterClrMapping/>
+  </p:clrMapOvr>
+</p:sld>
+</file>
+
+<file path=ppt/slides/slide18.xml><?xml version="1.0" encoding="utf-8"?>
+<p:sld xmlns:a="http://schemas.openxmlformats.org/drawingml/2006/main" xmlns:r="http://schemas.openxmlformats.org/officeDocument/2006/relationships" xmlns:p="http://schemas.openxmlformats.org/presentationml/2006/main">
+  <p:cSld>
+    <p:spTree>
+      <p:nvGrpSpPr>
+        <p:cNvPr id="1" name=""/>
+        <p:cNvGrpSpPr/>
+        <p:nvPr/>
+      </p:nvGrpSpPr>
+      <p:grpSpPr>
+        <a:xfrm>
+          <a:off x="0" y="0"/>
+          <a:ext cx="0" cy="0"/>
+          <a:chOff x="0" y="0"/>
+          <a:chExt cx="0" cy="0"/>
+        </a:xfrm>
+      </p:grpSpPr>
+      <p:sp>
+        <p:nvSpPr>
+          <p:cNvPr id="2" name="Title 1">
+            <a:extLst>
+              <a:ext uri="{FF2B5EF4-FFF2-40B4-BE49-F238E27FC236}">
+                <a16:creationId xmlns:a16="http://schemas.microsoft.com/office/drawing/2014/main" id="{D5A31E08-DFB8-8419-DA11-4FDD0BAD36A9}"/>
+              </a:ext>
+            </a:extLst>
+          </p:cNvPr>
+          <p:cNvSpPr>
+            <a:spLocks noGrp="1"/>
+          </p:cNvSpPr>
+          <p:nvPr>
+            <p:ph type="title"/>
+          </p:nvPr>
+        </p:nvSpPr>
+        <p:spPr>
+          <a:xfrm>
+            <a:off x="1824111" y="723900"/>
+            <a:ext cx="8543779" cy="446557"/>
+          </a:xfrm>
+        </p:spPr>
+        <p:txBody>
+          <a:bodyPr anchor="b">
+            <a:normAutofit fontScale="90000"/>
+          </a:bodyPr>
+          <a:lstStyle/>
+          <a:p>
+            <a:pPr algn="ctr"/>
+            <a:endParaRPr lang="en-IN" dirty="0"/>
+          </a:p>
+        </p:txBody>
+      </p:sp>
+      <p:pic>
+        <p:nvPicPr>
+          <p:cNvPr id="5" name="Picture 4">
+            <a:extLst>
+              <a:ext uri="{FF2B5EF4-FFF2-40B4-BE49-F238E27FC236}">
+                <a16:creationId xmlns:a16="http://schemas.microsoft.com/office/drawing/2014/main" id="{D78B1E0F-5B8B-79CD-1526-98915F253183}"/>
+              </a:ext>
+            </a:extLst>
+          </p:cNvPr>
+          <p:cNvPicPr>
+            <a:picLocks noChangeAspect="1"/>
+          </p:cNvPicPr>
+          <p:nvPr/>
+        </p:nvPicPr>
+        <p:blipFill>
+          <a:blip r:embed="rId2"/>
+          <a:stretch>
+            <a:fillRect/>
+          </a:stretch>
+        </p:blipFill>
+        <p:spPr>
+          <a:xfrm>
+            <a:off x="2760610" y="1798107"/>
+            <a:ext cx="6670779" cy="3906124"/>
+          </a:xfrm>
+          <a:prstGeom prst="rect">
+            <a:avLst/>
+          </a:prstGeom>
+        </p:spPr>
+      </p:pic>
+    </p:spTree>
+    <p:extLst>
+      <p:ext uri="{BB962C8B-B14F-4D97-AF65-F5344CB8AC3E}">
+        <p14:creationId xmlns:p14="http://schemas.microsoft.com/office/powerpoint/2010/main" val="2136942655"/>
+      </p:ext>
+    </p:extLst>
+  </p:cSld>
+  <p:clrMapOvr>
+    <a:masterClrMapping/>
+  </p:clrMapOvr>
+</p:sld>
+</file>
+
+<file path=ppt/slides/slide19.xml><?xml version="1.0" encoding="utf-8"?>
+<p:sld xmlns:a="http://schemas.openxmlformats.org/drawingml/2006/main" xmlns:r="http://schemas.openxmlformats.org/officeDocument/2006/relationships" xmlns:p="http://schemas.openxmlformats.org/presentationml/2006/main">
+  <p:cSld>
+    <p:spTree>
+      <p:nvGrpSpPr>
+        <p:cNvPr id="1" name=""/>
+        <p:cNvGrpSpPr/>
+        <p:nvPr/>
+      </p:nvGrpSpPr>
+      <p:grpSpPr>
+        <a:xfrm>
+          <a:off x="0" y="0"/>
+          <a:ext cx="0" cy="0"/>
+          <a:chOff x="0" y="0"/>
+          <a:chExt cx="0" cy="0"/>
+        </a:xfrm>
+      </p:grpSpPr>
+      <p:sp>
+        <p:nvSpPr>
+          <p:cNvPr id="2" name="Title 1">
+            <a:extLst>
+              <a:ext uri="{FF2B5EF4-FFF2-40B4-BE49-F238E27FC236}">
+                <a16:creationId xmlns:a16="http://schemas.microsoft.com/office/drawing/2014/main" id="{D5A31E08-DFB8-8419-DA11-4FDD0BAD36A9}"/>
+              </a:ext>
+            </a:extLst>
+          </p:cNvPr>
+          <p:cNvSpPr>
+            <a:spLocks noGrp="1"/>
+          </p:cNvSpPr>
+          <p:nvPr>
+            <p:ph type="title"/>
+          </p:nvPr>
+        </p:nvSpPr>
+        <p:spPr>
+          <a:xfrm>
+            <a:off x="1824111" y="723900"/>
+            <a:ext cx="8543779" cy="446557"/>
+          </a:xfrm>
+        </p:spPr>
+        <p:txBody>
+          <a:bodyPr anchor="b">
+            <a:normAutofit fontScale="90000"/>
+          </a:bodyPr>
+          <a:lstStyle/>
+          <a:p>
+            <a:pPr algn="ctr"/>
+            <a:endParaRPr lang="en-IN" dirty="0"/>
+          </a:p>
+        </p:txBody>
+      </p:sp>
+      <p:pic>
+        <p:nvPicPr>
+          <p:cNvPr id="5" name="Picture 4">
+            <a:extLst>
+              <a:ext uri="{FF2B5EF4-FFF2-40B4-BE49-F238E27FC236}">
+                <a16:creationId xmlns:a16="http://schemas.microsoft.com/office/drawing/2014/main" id="{98DBAF97-8EAD-DD19-6107-DC15AF0B2407}"/>
+              </a:ext>
+            </a:extLst>
+          </p:cNvPr>
+          <p:cNvPicPr>
+            <a:picLocks noChangeAspect="1"/>
+          </p:cNvPicPr>
+          <p:nvPr/>
+        </p:nvPicPr>
+        <p:blipFill>
+          <a:blip r:embed="rId2"/>
+          <a:stretch>
+            <a:fillRect/>
+          </a:stretch>
+        </p:blipFill>
+        <p:spPr>
+          <a:xfrm>
+            <a:off x="2636524" y="1788581"/>
+            <a:ext cx="6918951" cy="4045919"/>
+          </a:xfrm>
+          <a:prstGeom prst="rect">
+            <a:avLst/>
+          </a:prstGeom>
+        </p:spPr>
+      </p:pic>
+    </p:spTree>
+    <p:extLst>
+      <p:ext uri="{BB962C8B-B14F-4D97-AF65-F5344CB8AC3E}">
+        <p14:creationId xmlns:p14="http://schemas.microsoft.com/office/powerpoint/2010/main" val="1454040411"/>
+      </p:ext>
+    </p:extLst>
+  </p:cSld>
+  <p:clrMapOvr>
+    <a:masterClrMapping/>
+  </p:clrMapOvr>
+</p:sld>
+</file>
+
+<file path=ppt/slides/slide2.xml><?xml version="1.0" encoding="utf-8"?>
+<p:sld xmlns:a="http://schemas.openxmlformats.org/drawingml/2006/main" xmlns:r="http://schemas.openxmlformats.org/officeDocument/2006/relationships" xmlns:p="http://schemas.openxmlformats.org/presentationml/2006/main">
+  <p:cSld>
+    <p:bg>
+      <p:bgPr>
+        <a:solidFill>
+          <a:schemeClr val="bg1"/>
+        </a:solidFill>
+        <a:effectLst/>
+      </p:bgPr>
+    </p:bg>
+    <p:spTree>
+      <p:nvGrpSpPr>
+        <p:cNvPr id="1" name=""/>
+        <p:cNvGrpSpPr/>
+        <p:nvPr/>
+      </p:nvGrpSpPr>
+      <p:grpSpPr>
+        <a:xfrm>
+          <a:off x="0" y="0"/>
+          <a:ext cx="0" cy="0"/>
+          <a:chOff x="0" y="0"/>
+          <a:chExt cx="0" cy="0"/>
+        </a:xfrm>
+      </p:grpSpPr>
+      <p:sp useBgFill="1">
+        <p:nvSpPr>
+          <p:cNvPr id="8" name="Rectangle 7">
+            <a:extLst>
+              <a:ext uri="{FF2B5EF4-FFF2-40B4-BE49-F238E27FC236}">
+                <a16:creationId xmlns:a16="http://schemas.microsoft.com/office/drawing/2014/main" id="{7B22176A-41DB-4D9A-9B6F-F2296F1ED173}"/>
+              </a:ext>
+              <a:ext uri="{C183D7F6-B498-43B3-948B-1728B52AA6E4}">
+                <adec:decorative xmlns:adec="http://schemas.microsoft.com/office/drawing/2017/decorative" val="1"/>
+              </a:ext>
+            </a:extLst>
+          </p:cNvPr>
+          <p:cNvSpPr>
+            <a:spLocks noGrp="1" noRot="1" noChangeAspect="1" noMove="1" noResize="1" noEditPoints="1" noAdjustHandles="1" noChangeArrowheads="1" noChangeShapeType="1" noTextEdit="1"/>
+          </p:cNvSpPr>
+          <p:nvPr>
+            <p:extLst>
+              <p:ext uri="{386F3935-93C4-4BCD-93E2-E3B085C9AB24}">
+                <p16:designElem xmlns:p16="http://schemas.microsoft.com/office/powerpoint/2015/main" val="1"/>
+              </p:ext>
+            </p:extLst>
+          </p:nvPr>
+        </p:nvSpPr>
+        <p:spPr>
+          <a:xfrm>
+            <a:off x="0" y="0"/>
+            <a:ext cx="12192000" cy="6858000"/>
+          </a:xfrm>
+          <a:prstGeom prst="rect">
+            <a:avLst/>
+          </a:prstGeom>
+          <a:ln w="12700" cap="flat" cmpd="sng" algn="ctr">
+            <a:noFill/>
+            <a:prstDash val="solid"/>
+            <a:miter lim="800000"/>
+          </a:ln>
+          <a:effectLst/>
+        </p:spPr>
+        <p:style>
+          <a:lnRef idx="2">
+            <a:schemeClr val="accent1">
+              <a:shade val="50000"/>
+            </a:schemeClr>
+          </a:lnRef>
+          <a:fillRef idx="1">
+            <a:schemeClr val="accent1"/>
+          </a:fillRef>
+          <a:effectRef idx="0">
+            <a:schemeClr val="accent1"/>
+          </a:effectRef>
+          <a:fontRef idx="minor">
+            <a:schemeClr val="lt1"/>
+          </a:fontRef>
+        </p:style>
+        <p:txBody>
+          <a:bodyPr rtlCol="0" anchor="ctr"/>
+          <a:lstStyle/>
+          <a:p>
+            <a:pPr algn="ctr"/>
+            <a:endParaRPr lang="en-US"/>
+          </a:p>
+        </p:txBody>
+      </p:sp>
+      <p:sp>
+        <p:nvSpPr>
+          <p:cNvPr id="10" name="Rectangle 9">
+            <a:extLst>
+              <a:ext uri="{FF2B5EF4-FFF2-40B4-BE49-F238E27FC236}">
+                <a16:creationId xmlns:a16="http://schemas.microsoft.com/office/drawing/2014/main" id="{774A8DF5-445E-49C5-B10A-8DF5FEFBCC46}"/>
+              </a:ext>
+              <a:ext uri="{C183D7F6-B498-43B3-948B-1728B52AA6E4}">
+                <adec:decorative xmlns:adec="http://schemas.microsoft.com/office/drawing/2017/decorative" val="1"/>
+              </a:ext>
+            </a:extLst>
+          </p:cNvPr>
+          <p:cNvSpPr>
+            <a:spLocks noGrp="1" noRot="1" noChangeAspect="1" noMove="1" noResize="1" noEditPoints="1" noAdjustHandles="1" noChangeArrowheads="1" noChangeShapeType="1" noTextEdit="1"/>
+          </p:cNvSpPr>
+          <p:nvPr>
+            <p:extLst>
+              <p:ext uri="{386F3935-93C4-4BCD-93E2-E3B085C9AB24}">
+                <p16:designElem xmlns:p16="http://schemas.microsoft.com/office/powerpoint/2015/main" val="1"/>
+              </p:ext>
+            </p:extLst>
+          </p:nvPr>
+        </p:nvSpPr>
+        <p:spPr>
+          <a:xfrm>
+            <a:off x="0" y="0"/>
+            <a:ext cx="12192000" cy="6858000"/>
+          </a:xfrm>
+          <a:prstGeom prst="rect">
+            <a:avLst/>
+          </a:prstGeom>
+          <a:solidFill>
+            <a:schemeClr val="bg2"/>
+          </a:solidFill>
+          <a:ln w="12700" cap="flat" cmpd="sng" algn="ctr">
+            <a:noFill/>
+            <a:prstDash val="solid"/>
+            <a:miter lim="800000"/>
+          </a:ln>
+          <a:effectLst/>
+        </p:spPr>
+        <p:style>
+          <a:lnRef idx="2">
+            <a:schemeClr val="accent1">
+              <a:shade val="50000"/>
+            </a:schemeClr>
+          </a:lnRef>
+          <a:fillRef idx="1">
+            <a:schemeClr val="accent1"/>
+          </a:fillRef>
+          <a:effectRef idx="0">
+            <a:schemeClr val="accent1"/>
+          </a:effectRef>
+          <a:fontRef idx="minor">
+            <a:schemeClr val="lt1"/>
+          </a:fontRef>
+        </p:style>
+        <p:txBody>
+          <a:bodyPr rtlCol="0" anchor="ctr"/>
+          <a:lstStyle/>
+          <a:p>
+            <a:pPr algn="ctr"/>
+            <a:endParaRPr lang="en-US"/>
+          </a:p>
+        </p:txBody>
+      </p:sp>
+      <p:sp>
+        <p:nvSpPr>
+          <p:cNvPr id="12" name="Rectangle 11">
+            <a:extLst>
+              <a:ext uri="{FF2B5EF4-FFF2-40B4-BE49-F238E27FC236}">
+                <a16:creationId xmlns:a16="http://schemas.microsoft.com/office/drawing/2014/main" id="{9A4E38D9-EFB8-40B5-B42B-514FBF180360}"/>
+              </a:ext>
+              <a:ext uri="{C183D7F6-B498-43B3-948B-1728B52AA6E4}">
+                <adec:decorative xmlns:adec="http://schemas.microsoft.com/office/drawing/2017/decorative" val="1"/>
+              </a:ext>
+            </a:extLst>
+          </p:cNvPr>
+          <p:cNvSpPr>
+            <a:spLocks noGrp="1" noRot="1" noChangeAspect="1" noMove="1" noResize="1" noEditPoints="1" noAdjustHandles="1" noChangeArrowheads="1" noChangeShapeType="1" noTextEdit="1"/>
+          </p:cNvSpPr>
+          <p:nvPr>
+            <p:extLst>
+              <p:ext uri="{386F3935-93C4-4BCD-93E2-E3B085C9AB24}">
+                <p16:designElem xmlns:p16="http://schemas.microsoft.com/office/powerpoint/2015/main" val="1"/>
+              </p:ext>
+            </p:extLst>
+          </p:nvPr>
+        </p:nvSpPr>
+        <p:spPr>
+          <a:xfrm>
+            <a:off x="160920" y="157606"/>
+            <a:ext cx="11870161" cy="6542788"/>
+          </a:xfrm>
+          <a:prstGeom prst="rect">
+            <a:avLst/>
+          </a:prstGeom>
+          <a:solidFill>
+            <a:schemeClr val="bg1"/>
+          </a:solidFill>
+          <a:ln>
+            <a:noFill/>
+          </a:ln>
+        </p:spPr>
+        <p:style>
+          <a:lnRef idx="2">
+            <a:schemeClr val="accent1">
+              <a:shade val="50000"/>
+            </a:schemeClr>
+          </a:lnRef>
+          <a:fillRef idx="1">
+            <a:schemeClr val="accent1"/>
+          </a:fillRef>
+          <a:effectRef idx="0">
+            <a:schemeClr val="accent1"/>
+          </a:effectRef>
+          <a:fontRef idx="minor">
+            <a:schemeClr val="lt1"/>
+          </a:fontRef>
+        </p:style>
+        <p:txBody>
+          <a:bodyPr rtlCol="0" anchor="ctr"/>
+          <a:lstStyle/>
+          <a:p>
+            <a:pPr algn="ctr"/>
+            <a:endParaRPr lang="en-US"/>
+          </a:p>
+        </p:txBody>
+      </p:sp>
+      <p:sp>
+        <p:nvSpPr>
+          <p:cNvPr id="2" name="Title 1">
+            <a:extLst>
+              <a:ext uri="{FF2B5EF4-FFF2-40B4-BE49-F238E27FC236}">
+                <a16:creationId xmlns:a16="http://schemas.microsoft.com/office/drawing/2014/main" id="{D5A31E08-DFB8-8419-DA11-4FDD0BAD36A9}"/>
+              </a:ext>
+            </a:extLst>
+          </p:cNvPr>
+          <p:cNvSpPr>
+            <a:spLocks noGrp="1"/>
+          </p:cNvSpPr>
+          <p:nvPr>
+            <p:ph type="title"/>
+          </p:nvPr>
+        </p:nvSpPr>
+        <p:spPr>
+          <a:xfrm>
+            <a:off x="1824111" y="723900"/>
+            <a:ext cx="8543779" cy="446557"/>
+          </a:xfrm>
+        </p:spPr>
+        <p:txBody>
+          <a:bodyPr anchor="b">
+            <a:normAutofit fontScale="90000"/>
+          </a:bodyPr>
+          <a:lstStyle/>
+          <a:p>
+            <a:pPr algn="ctr"/>
+            <a:endParaRPr lang="en-IN" dirty="0"/>
+          </a:p>
+        </p:txBody>
+      </p:sp>
+      <p:grpSp>
+        <p:nvGrpSpPr>
+          <p:cNvPr id="14" name="Group 13">
+            <a:extLst>
+              <a:ext uri="{FF2B5EF4-FFF2-40B4-BE49-F238E27FC236}">
+                <a16:creationId xmlns:a16="http://schemas.microsoft.com/office/drawing/2014/main" id="{36996A92-4C38-41D1-AD08-0008BD7F8BE2}"/>
+              </a:ext>
+              <a:ext uri="{C183D7F6-B498-43B3-948B-1728B52AA6E4}">
+                <adec:decorative xmlns:adec="http://schemas.microsoft.com/office/drawing/2017/decorative" val="1"/>
+              </a:ext>
+            </a:extLst>
+          </p:cNvPr>
+          <p:cNvGrpSpPr>
+            <a:grpSpLocks noGrp="1" noUngrp="1" noRot="1" noChangeAspect="1" noMove="1" noResize="1"/>
+          </p:cNvGrpSpPr>
+          <p:nvPr>
+            <p:extLst>
+              <p:ext uri="{386F3935-93C4-4BCD-93E2-E3B085C9AB24}">
+                <p16:designElem xmlns:p16="http://schemas.microsoft.com/office/powerpoint/2015/main" val="1"/>
+              </p:ext>
+            </p:extLst>
+          </p:nvPr>
+        </p:nvGrpSpPr>
+        <p:grpSpPr>
+          <a:xfrm>
+            <a:off x="5662258" y="5849932"/>
+            <a:ext cx="867485" cy="115439"/>
+            <a:chOff x="8910933" y="1861308"/>
+            <a:chExt cx="867485" cy="115439"/>
+          </a:xfrm>
+        </p:grpSpPr>
+        <p:sp>
+          <p:nvSpPr>
+            <p:cNvPr id="15" name="Rectangle 14">
+              <a:extLst>
+                <a:ext uri="{FF2B5EF4-FFF2-40B4-BE49-F238E27FC236}">
+                  <a16:creationId xmlns:a16="http://schemas.microsoft.com/office/drawing/2014/main" id="{5AD7C091-483D-4EDB-A080-485373410AB7}"/>
+                </a:ext>
+                <a:ext uri="{C183D7F6-B498-43B3-948B-1728B52AA6E4}">
+                  <adec:decorative xmlns:adec="http://schemas.microsoft.com/office/drawing/2017/decorative" val="1"/>
+                </a:ext>
+              </a:extLst>
+            </p:cNvPr>
+            <p:cNvSpPr/>
+            <p:nvPr>
+              <p:extLst>
+                <p:ext uri="{386F3935-93C4-4BCD-93E2-E3B085C9AB24}">
+                  <p16:designElem xmlns:p16="http://schemas.microsoft.com/office/powerpoint/2015/main" val="1"/>
+                </p:ext>
+              </p:extLst>
+            </p:nvPr>
+          </p:nvSpPr>
+          <p:spPr>
+            <a:xfrm rot="18964825" flipH="1">
+              <a:off x="9286956" y="1861308"/>
+              <a:ext cx="115439" cy="115439"/>
+            </a:xfrm>
+            <a:prstGeom prst="rect">
+              <a:avLst/>
+            </a:prstGeom>
+            <a:noFill/>
+            <a:ln w="15875">
+              <a:solidFill>
+                <a:schemeClr val="tx2"/>
+              </a:solidFill>
+            </a:ln>
+          </p:spPr>
+          <p:style>
+            <a:lnRef idx="2">
+              <a:schemeClr val="accent1">
+                <a:shade val="50000"/>
+              </a:schemeClr>
+            </a:lnRef>
+            <a:fillRef idx="1">
+              <a:schemeClr val="accent1"/>
+            </a:fillRef>
+            <a:effectRef idx="0">
+              <a:schemeClr val="accent1"/>
+            </a:effectRef>
+            <a:fontRef idx="minor">
+              <a:schemeClr val="lt1"/>
+            </a:fontRef>
+          </p:style>
+          <p:txBody>
+            <a:bodyPr rtlCol="0" anchor="ctr"/>
+            <a:lstStyle/>
+            <a:p>
+              <a:pPr algn="ctr"/>
+              <a:endParaRPr lang="en-US">
+                <a:solidFill>
+                  <a:schemeClr val="bg1"/>
+                </a:solidFill>
+                <a:effectLst>
+                  <a:outerShdw blurRad="38100" dist="38100" dir="2700000" algn="tl">
+                    <a:srgbClr val="000000">
+                      <a:alpha val="43137"/>
+                    </a:srgbClr>
+                  </a:outerShdw>
+                </a:effectLst>
+              </a:endParaRPr>
+            </a:p>
+          </p:txBody>
+        </p:sp>
+        <p:cxnSp>
+          <p:nvCxnSpPr>
+            <p:cNvPr id="16" name="Straight Connector 15">
+              <a:extLst>
+                <a:ext uri="{FF2B5EF4-FFF2-40B4-BE49-F238E27FC236}">
+                  <a16:creationId xmlns:a16="http://schemas.microsoft.com/office/drawing/2014/main" id="{0FDA491D-22E6-4239-BC5F-3CB07CB5587F}"/>
+                </a:ext>
+                <a:ext uri="{C183D7F6-B498-43B3-948B-1728B52AA6E4}">
+                  <adec:decorative xmlns:adec="http://schemas.microsoft.com/office/drawing/2017/decorative" val="1"/>
+                </a:ext>
+              </a:extLst>
+            </p:cNvPr>
+            <p:cNvCxnSpPr/>
+            <p:nvPr>
+              <p:extLst>
+                <p:ext uri="{386F3935-93C4-4BCD-93E2-E3B085C9AB24}">
+                  <p16:designElem xmlns:p16="http://schemas.microsoft.com/office/powerpoint/2015/main" val="1"/>
+                </p:ext>
+              </p:extLst>
+            </p:nvPr>
+          </p:nvCxnSpPr>
+          <p:spPr>
+            <a:xfrm>
+              <a:off x="9426289" y="1919027"/>
+              <a:ext cx="352129" cy="0"/>
+            </a:xfrm>
+            <a:prstGeom prst="line">
+              <a:avLst/>
+            </a:prstGeom>
+            <a:ln w="15875">
+              <a:solidFill>
+                <a:schemeClr val="tx2"/>
+              </a:solidFill>
+            </a:ln>
+          </p:spPr>
+          <p:style>
+            <a:lnRef idx="1">
+              <a:schemeClr val="accent1"/>
+            </a:lnRef>
+            <a:fillRef idx="0">
+              <a:schemeClr val="accent1"/>
+            </a:fillRef>
+            <a:effectRef idx="0">
+              <a:schemeClr val="accent1"/>
+            </a:effectRef>
+            <a:fontRef idx="minor">
+              <a:schemeClr val="tx1"/>
+            </a:fontRef>
+          </p:style>
+        </p:cxnSp>
+        <p:cxnSp>
+          <p:nvCxnSpPr>
+            <p:cNvPr id="17" name="Straight Connector 16">
+              <a:extLst>
+                <a:ext uri="{FF2B5EF4-FFF2-40B4-BE49-F238E27FC236}">
+                  <a16:creationId xmlns:a16="http://schemas.microsoft.com/office/drawing/2014/main" id="{C2B1C725-5027-440D-9130-AE6A287B9C0D}"/>
+                </a:ext>
+                <a:ext uri="{C183D7F6-B498-43B3-948B-1728B52AA6E4}">
+                  <adec:decorative xmlns:adec="http://schemas.microsoft.com/office/drawing/2017/decorative" val="1"/>
+                </a:ext>
+              </a:extLst>
+            </p:cNvPr>
+            <p:cNvCxnSpPr/>
+            <p:nvPr>
+              <p:extLst>
+                <p:ext uri="{386F3935-93C4-4BCD-93E2-E3B085C9AB24}">
+                  <p16:designElem xmlns:p16="http://schemas.microsoft.com/office/powerpoint/2015/main" val="1"/>
+                </p:ext>
+              </p:extLst>
+            </p:nvPr>
+          </p:nvCxnSpPr>
+          <p:spPr>
+            <a:xfrm>
+              <a:off x="8910933" y="1919027"/>
+              <a:ext cx="352129" cy="0"/>
+            </a:xfrm>
+            <a:prstGeom prst="line">
+              <a:avLst/>
+            </a:prstGeom>
+            <a:ln w="15875">
+              <a:solidFill>
+                <a:schemeClr val="tx2"/>
+              </a:solidFill>
+            </a:ln>
+          </p:spPr>
+          <p:style>
+            <a:lnRef idx="1">
+              <a:schemeClr val="accent1"/>
+            </a:lnRef>
+            <a:fillRef idx="0">
+              <a:schemeClr val="accent1"/>
+            </a:fillRef>
+            <a:effectRef idx="0">
+              <a:schemeClr val="accent1"/>
+            </a:effectRef>
+            <a:fontRef idx="minor">
+              <a:schemeClr val="tx1"/>
+            </a:fontRef>
+          </p:style>
+        </p:cxnSp>
+      </p:grpSp>
+      <p:pic>
+        <p:nvPicPr>
+          <p:cNvPr id="11" name="Picture 10">
+            <a:extLst>
+              <a:ext uri="{FF2B5EF4-FFF2-40B4-BE49-F238E27FC236}">
+                <a16:creationId xmlns:a16="http://schemas.microsoft.com/office/drawing/2014/main" id="{5C82C47A-888F-42C4-FCF3-F56EA85A69F8}"/>
+              </a:ext>
+            </a:extLst>
+          </p:cNvPr>
+          <p:cNvPicPr>
+            <a:picLocks noChangeAspect="1"/>
+          </p:cNvPicPr>
+          <p:nvPr/>
+        </p:nvPicPr>
+        <p:blipFill>
+          <a:blip r:embed="rId2"/>
+          <a:stretch>
+            <a:fillRect/>
+          </a:stretch>
+        </p:blipFill>
+        <p:spPr>
+          <a:xfrm>
+            <a:off x="2932784" y="1654630"/>
+            <a:ext cx="6326431" cy="3897082"/>
+          </a:xfrm>
+          <a:prstGeom prst="rect">
+            <a:avLst/>
+          </a:prstGeom>
+        </p:spPr>
+      </p:pic>
+    </p:spTree>
+    <p:extLst>
+      <p:ext uri="{BB962C8B-B14F-4D97-AF65-F5344CB8AC3E}">
+        <p14:creationId xmlns:p14="http://schemas.microsoft.com/office/powerpoint/2010/main" val="931281921"/>
+      </p:ext>
+    </p:extLst>
+  </p:cSld>
+  <p:clrMapOvr>
+    <a:masterClrMapping/>
+  </p:clrMapOvr>
+</p:sld>
+</file>
+
+<file path=ppt/slides/slide20.xml><?xml version="1.0" encoding="utf-8"?>
+<p:sld xmlns:a="http://schemas.openxmlformats.org/drawingml/2006/main" xmlns:r="http://schemas.openxmlformats.org/officeDocument/2006/relationships" xmlns:p="http://schemas.openxmlformats.org/presentationml/2006/main">
+  <p:cSld>
+    <p:spTree>
+      <p:nvGrpSpPr>
+        <p:cNvPr id="1" name=""/>
+        <p:cNvGrpSpPr/>
+        <p:nvPr/>
+      </p:nvGrpSpPr>
+      <p:grpSpPr>
+        <a:xfrm>
+          <a:off x="0" y="0"/>
+          <a:ext cx="0" cy="0"/>
+          <a:chOff x="0" y="0"/>
+          <a:chExt cx="0" cy="0"/>
+        </a:xfrm>
+      </p:grpSpPr>
+      <p:sp>
+        <p:nvSpPr>
+          <p:cNvPr id="2" name="Title 1">
+            <a:extLst>
+              <a:ext uri="{FF2B5EF4-FFF2-40B4-BE49-F238E27FC236}">
+                <a16:creationId xmlns:a16="http://schemas.microsoft.com/office/drawing/2014/main" id="{D5A31E08-DFB8-8419-DA11-4FDD0BAD36A9}"/>
+              </a:ext>
+            </a:extLst>
+          </p:cNvPr>
+          <p:cNvSpPr>
+            <a:spLocks noGrp="1"/>
+          </p:cNvSpPr>
+          <p:nvPr>
+            <p:ph type="title"/>
+          </p:nvPr>
+        </p:nvSpPr>
+        <p:spPr>
+          <a:xfrm>
+            <a:off x="1824111" y="723900"/>
+            <a:ext cx="8543779" cy="446557"/>
+          </a:xfrm>
+        </p:spPr>
+        <p:txBody>
+          <a:bodyPr anchor="b">
+            <a:normAutofit fontScale="90000"/>
+          </a:bodyPr>
+          <a:lstStyle/>
+          <a:p>
+            <a:pPr algn="ctr"/>
+            <a:endParaRPr lang="en-IN" dirty="0"/>
+          </a:p>
+        </p:txBody>
+      </p:sp>
+      <p:pic>
+        <p:nvPicPr>
+          <p:cNvPr id="5" name="Picture 4">
+            <a:extLst>
+              <a:ext uri="{FF2B5EF4-FFF2-40B4-BE49-F238E27FC236}">
+                <a16:creationId xmlns:a16="http://schemas.microsoft.com/office/drawing/2014/main" id="{C758EEA3-2462-3038-D1D3-8288756707DA}"/>
+              </a:ext>
+            </a:extLst>
+          </p:cNvPr>
+          <p:cNvPicPr>
+            <a:picLocks noChangeAspect="1"/>
+          </p:cNvPicPr>
+          <p:nvPr/>
+        </p:nvPicPr>
+        <p:blipFill>
+          <a:blip r:embed="rId2"/>
+          <a:stretch>
+            <a:fillRect/>
+          </a:stretch>
+        </p:blipFill>
+        <p:spPr>
+          <a:xfrm>
+            <a:off x="2578451" y="1644589"/>
+            <a:ext cx="6826806" cy="4067501"/>
+          </a:xfrm>
+          <a:prstGeom prst="rect">
+            <a:avLst/>
+          </a:prstGeom>
+        </p:spPr>
+      </p:pic>
+    </p:spTree>
+    <p:extLst>
+      <p:ext uri="{BB962C8B-B14F-4D97-AF65-F5344CB8AC3E}">
+        <p14:creationId xmlns:p14="http://schemas.microsoft.com/office/powerpoint/2010/main" val="2497234245"/>
+      </p:ext>
+    </p:extLst>
+  </p:cSld>
+  <p:clrMapOvr>
+    <a:masterClrMapping/>
+  </p:clrMapOvr>
+</p:sld>
+</file>
+
+<file path=ppt/slides/slide21.xml><?xml version="1.0" encoding="utf-8"?>
+<p:sld xmlns:a="http://schemas.openxmlformats.org/drawingml/2006/main" xmlns:r="http://schemas.openxmlformats.org/officeDocument/2006/relationships" xmlns:p="http://schemas.openxmlformats.org/presentationml/2006/main">
+  <p:cSld>
+    <p:spTree>
+      <p:nvGrpSpPr>
+        <p:cNvPr id="1" name=""/>
+        <p:cNvGrpSpPr/>
+        <p:nvPr/>
+      </p:nvGrpSpPr>
+      <p:grpSpPr>
+        <a:xfrm>
+          <a:off x="0" y="0"/>
+          <a:ext cx="0" cy="0"/>
+          <a:chOff x="0" y="0"/>
+          <a:chExt cx="0" cy="0"/>
+        </a:xfrm>
+      </p:grpSpPr>
+      <p:sp>
+        <p:nvSpPr>
+          <p:cNvPr id="2" name="Title 1">
+            <a:extLst>
+              <a:ext uri="{FF2B5EF4-FFF2-40B4-BE49-F238E27FC236}">
+                <a16:creationId xmlns:a16="http://schemas.microsoft.com/office/drawing/2014/main" id="{D5A31E08-DFB8-8419-DA11-4FDD0BAD36A9}"/>
+              </a:ext>
+            </a:extLst>
+          </p:cNvPr>
+          <p:cNvSpPr>
+            <a:spLocks noGrp="1"/>
+          </p:cNvSpPr>
+          <p:nvPr>
+            <p:ph type="title"/>
+          </p:nvPr>
+        </p:nvSpPr>
+        <p:spPr>
+          <a:xfrm>
+            <a:off x="1824111" y="723900"/>
+            <a:ext cx="8543779" cy="446557"/>
+          </a:xfrm>
+        </p:spPr>
+        <p:txBody>
+          <a:bodyPr anchor="b">
+            <a:normAutofit fontScale="90000"/>
+          </a:bodyPr>
+          <a:lstStyle/>
+          <a:p>
+            <a:pPr algn="ctr"/>
+            <a:endParaRPr lang="en-IN" dirty="0"/>
+          </a:p>
+        </p:txBody>
+      </p:sp>
+      <p:pic>
+        <p:nvPicPr>
+          <p:cNvPr id="5" name="Picture 4">
+            <a:extLst>
+              <a:ext uri="{FF2B5EF4-FFF2-40B4-BE49-F238E27FC236}">
+                <a16:creationId xmlns:a16="http://schemas.microsoft.com/office/drawing/2014/main" id="{F7103E35-3B4D-6D01-FFDB-F9F8617B3748}"/>
+              </a:ext>
+            </a:extLst>
+          </p:cNvPr>
+          <p:cNvPicPr>
+            <a:picLocks noChangeAspect="1"/>
+          </p:cNvPicPr>
+          <p:nvPr/>
+        </p:nvPicPr>
+        <p:blipFill>
+          <a:blip r:embed="rId2"/>
+          <a:stretch>
+            <a:fillRect/>
+          </a:stretch>
+        </p:blipFill>
+        <p:spPr>
+          <a:xfrm>
+            <a:off x="2705868" y="1327947"/>
+            <a:ext cx="6780264" cy="5040196"/>
+          </a:xfrm>
+          <a:prstGeom prst="rect">
+            <a:avLst/>
+          </a:prstGeom>
+        </p:spPr>
+      </p:pic>
+    </p:spTree>
+    <p:extLst>
+      <p:ext uri="{BB962C8B-B14F-4D97-AF65-F5344CB8AC3E}">
+        <p14:creationId xmlns:p14="http://schemas.microsoft.com/office/powerpoint/2010/main" val="3818902925"/>
+      </p:ext>
+    </p:extLst>
+  </p:cSld>
+  <p:clrMapOvr>
+    <a:masterClrMapping/>
+  </p:clrMapOvr>
+</p:sld>
+</file>
+
+<file path=ppt/slides/slide22.xml><?xml version="1.0" encoding="utf-8"?>
+<p:sld xmlns:a="http://schemas.openxmlformats.org/drawingml/2006/main" xmlns:r="http://schemas.openxmlformats.org/officeDocument/2006/relationships" xmlns:p="http://schemas.openxmlformats.org/presentationml/2006/main">
+  <p:cSld>
+    <p:spTree>
+      <p:nvGrpSpPr>
+        <p:cNvPr id="1" name=""/>
+        <p:cNvGrpSpPr/>
+        <p:nvPr/>
+      </p:nvGrpSpPr>
+      <p:grpSpPr>
+        <a:xfrm>
+          <a:off x="0" y="0"/>
+          <a:ext cx="0" cy="0"/>
+          <a:chOff x="0" y="0"/>
+          <a:chExt cx="0" cy="0"/>
+        </a:xfrm>
+      </p:grpSpPr>
+      <p:sp>
+        <p:nvSpPr>
+          <p:cNvPr id="2" name="Title 1">
+            <a:extLst>
+              <a:ext uri="{FF2B5EF4-FFF2-40B4-BE49-F238E27FC236}">
+                <a16:creationId xmlns:a16="http://schemas.microsoft.com/office/drawing/2014/main" id="{D5A31E08-DFB8-8419-DA11-4FDD0BAD36A9}"/>
+              </a:ext>
+            </a:extLst>
+          </p:cNvPr>
+          <p:cNvSpPr>
+            <a:spLocks noGrp="1"/>
+          </p:cNvSpPr>
+          <p:nvPr>
+            <p:ph type="title"/>
+          </p:nvPr>
+        </p:nvSpPr>
+        <p:spPr>
+          <a:xfrm>
+            <a:off x="1824111" y="723900"/>
+            <a:ext cx="8543779" cy="446557"/>
+          </a:xfrm>
+        </p:spPr>
+        <p:txBody>
+          <a:bodyPr anchor="b">
+            <a:normAutofit fontScale="90000"/>
+          </a:bodyPr>
+          <a:lstStyle/>
+          <a:p>
+            <a:pPr algn="ctr"/>
+            <a:endParaRPr lang="en-IN" dirty="0"/>
+          </a:p>
+        </p:txBody>
+      </p:sp>
+      <p:pic>
+        <p:nvPicPr>
+          <p:cNvPr id="5" name="Picture 4">
+            <a:extLst>
+              <a:ext uri="{FF2B5EF4-FFF2-40B4-BE49-F238E27FC236}">
+                <a16:creationId xmlns:a16="http://schemas.microsoft.com/office/drawing/2014/main" id="{E8143C9F-0273-2931-C6FC-069C0F7DEB82}"/>
+              </a:ext>
+            </a:extLst>
+          </p:cNvPr>
+          <p:cNvPicPr>
+            <a:picLocks noChangeAspect="1"/>
+          </p:cNvPicPr>
+          <p:nvPr/>
+        </p:nvPicPr>
+        <p:blipFill>
+          <a:blip r:embed="rId2"/>
+          <a:stretch>
+            <a:fillRect/>
+          </a:stretch>
+        </p:blipFill>
+        <p:spPr>
+          <a:xfrm>
+            <a:off x="2335958" y="1379201"/>
+            <a:ext cx="7520083" cy="5217542"/>
+          </a:xfrm>
+          <a:prstGeom prst="rect">
+            <a:avLst/>
+          </a:prstGeom>
+        </p:spPr>
+      </p:pic>
+    </p:spTree>
+    <p:extLst>
+      <p:ext uri="{BB962C8B-B14F-4D97-AF65-F5344CB8AC3E}">
+        <p14:creationId xmlns:p14="http://schemas.microsoft.com/office/powerpoint/2010/main" val="2992510202"/>
+      </p:ext>
+    </p:extLst>
+  </p:cSld>
+  <p:clrMapOvr>
+    <a:masterClrMapping/>
+  </p:clrMapOvr>
+</p:sld>
+</file>
+
+<file path=ppt/slides/slide23.xml><?xml version="1.0" encoding="utf-8"?>
+<p:sld xmlns:a="http://schemas.openxmlformats.org/drawingml/2006/main" xmlns:r="http://schemas.openxmlformats.org/officeDocument/2006/relationships" xmlns:p="http://schemas.openxmlformats.org/presentationml/2006/main">
+  <p:cSld>
+    <p:spTree>
+      <p:nvGrpSpPr>
+        <p:cNvPr id="1" name=""/>
+        <p:cNvGrpSpPr/>
+        <p:nvPr/>
+      </p:nvGrpSpPr>
+      <p:grpSpPr>
+        <a:xfrm>
+          <a:off x="0" y="0"/>
+          <a:ext cx="0" cy="0"/>
+          <a:chOff x="0" y="0"/>
+          <a:chExt cx="0" cy="0"/>
+        </a:xfrm>
+      </p:grpSpPr>
+      <p:sp>
+        <p:nvSpPr>
+          <p:cNvPr id="2" name="Title 1">
+            <a:extLst>
+              <a:ext uri="{FF2B5EF4-FFF2-40B4-BE49-F238E27FC236}">
+                <a16:creationId xmlns:a16="http://schemas.microsoft.com/office/drawing/2014/main" id="{D5A31E08-DFB8-8419-DA11-4FDD0BAD36A9}"/>
+              </a:ext>
+            </a:extLst>
+          </p:cNvPr>
+          <p:cNvSpPr>
+            <a:spLocks noGrp="1"/>
+          </p:cNvSpPr>
+          <p:nvPr>
+            <p:ph type="title"/>
+          </p:nvPr>
+        </p:nvSpPr>
+        <p:spPr>
+          <a:xfrm>
+            <a:off x="1824111" y="723900"/>
+            <a:ext cx="8543779" cy="446557"/>
+          </a:xfrm>
+        </p:spPr>
+        <p:txBody>
+          <a:bodyPr anchor="b">
+            <a:normAutofit fontScale="90000"/>
+          </a:bodyPr>
+          <a:lstStyle/>
+          <a:p>
+            <a:pPr algn="ctr"/>
+            <a:endParaRPr lang="en-IN" dirty="0"/>
+          </a:p>
+        </p:txBody>
+      </p:sp>
+      <p:pic>
+        <p:nvPicPr>
+          <p:cNvPr id="5" name="Picture 4">
+            <a:extLst>
+              <a:ext uri="{FF2B5EF4-FFF2-40B4-BE49-F238E27FC236}">
+                <a16:creationId xmlns:a16="http://schemas.microsoft.com/office/drawing/2014/main" id="{B85CFD17-EADE-BC2B-0C1C-FF80B1893961}"/>
+              </a:ext>
+            </a:extLst>
+          </p:cNvPr>
+          <p:cNvPicPr>
+            <a:picLocks noChangeAspect="1"/>
+          </p:cNvPicPr>
+          <p:nvPr/>
+        </p:nvPicPr>
+        <p:blipFill>
+          <a:blip r:embed="rId2"/>
+          <a:stretch>
+            <a:fillRect/>
+          </a:stretch>
+        </p:blipFill>
+        <p:spPr>
+          <a:xfrm>
+            <a:off x="2485609" y="1290754"/>
+            <a:ext cx="7220781" cy="5218903"/>
+          </a:xfrm>
+          <a:prstGeom prst="rect">
+            <a:avLst/>
+          </a:prstGeom>
+        </p:spPr>
+      </p:pic>
+    </p:spTree>
+    <p:extLst>
+      <p:ext uri="{BB962C8B-B14F-4D97-AF65-F5344CB8AC3E}">
+        <p14:creationId xmlns:p14="http://schemas.microsoft.com/office/powerpoint/2010/main" val="2849587185"/>
+      </p:ext>
+    </p:extLst>
+  </p:cSld>
+  <p:clrMapOvr>
+    <a:masterClrMapping/>
+  </p:clrMapOvr>
+</p:sld>
+</file>
+
+<file path=ppt/slides/slide24.xml><?xml version="1.0" encoding="utf-8"?>
+<p:sld xmlns:a="http://schemas.openxmlformats.org/drawingml/2006/main" xmlns:r="http://schemas.openxmlformats.org/officeDocument/2006/relationships" xmlns:p="http://schemas.openxmlformats.org/presentationml/2006/main">
+  <p:cSld>
+    <p:spTree>
+      <p:nvGrpSpPr>
+        <p:cNvPr id="1" name=""/>
+        <p:cNvGrpSpPr/>
+        <p:nvPr/>
+      </p:nvGrpSpPr>
+      <p:grpSpPr>
+        <a:xfrm>
+          <a:off x="0" y="0"/>
+          <a:ext cx="0" cy="0"/>
+          <a:chOff x="0" y="0"/>
+          <a:chExt cx="0" cy="0"/>
+        </a:xfrm>
+      </p:grpSpPr>
+      <p:sp>
+        <p:nvSpPr>
+          <p:cNvPr id="2" name="Title 1">
+            <a:extLst>
+              <a:ext uri="{FF2B5EF4-FFF2-40B4-BE49-F238E27FC236}">
+                <a16:creationId xmlns:a16="http://schemas.microsoft.com/office/drawing/2014/main" id="{D5A31E08-DFB8-8419-DA11-4FDD0BAD36A9}"/>
+              </a:ext>
+            </a:extLst>
+          </p:cNvPr>
+          <p:cNvSpPr>
+            <a:spLocks noGrp="1"/>
+          </p:cNvSpPr>
+          <p:nvPr>
+            <p:ph type="title"/>
+          </p:nvPr>
+        </p:nvSpPr>
+        <p:spPr>
+          <a:xfrm>
+            <a:off x="1824111" y="723900"/>
+            <a:ext cx="8543779" cy="446557"/>
+          </a:xfrm>
+        </p:spPr>
+        <p:txBody>
+          <a:bodyPr anchor="b">
+            <a:normAutofit fontScale="90000"/>
+          </a:bodyPr>
+          <a:lstStyle/>
+          <a:p>
+            <a:pPr algn="ctr"/>
+            <a:endParaRPr lang="en-IN" dirty="0"/>
+          </a:p>
+        </p:txBody>
+      </p:sp>
+      <p:pic>
+        <p:nvPicPr>
+          <p:cNvPr id="5" name="Picture 4">
+            <a:extLst>
+              <a:ext uri="{FF2B5EF4-FFF2-40B4-BE49-F238E27FC236}">
+                <a16:creationId xmlns:a16="http://schemas.microsoft.com/office/drawing/2014/main" id="{3119640B-F50E-A35A-606F-B2A2C58661F1}"/>
+              </a:ext>
+            </a:extLst>
+          </p:cNvPr>
+          <p:cNvPicPr>
+            <a:picLocks noChangeAspect="1"/>
+          </p:cNvPicPr>
+          <p:nvPr/>
+        </p:nvPicPr>
+        <p:blipFill>
+          <a:blip r:embed="rId2"/>
+          <a:stretch>
+            <a:fillRect/>
+          </a:stretch>
+        </p:blipFill>
+        <p:spPr>
+          <a:xfrm>
+            <a:off x="3412628" y="1285337"/>
+            <a:ext cx="5366743" cy="5224444"/>
+          </a:xfrm>
+          <a:prstGeom prst="rect">
+            <a:avLst/>
+          </a:prstGeom>
+        </p:spPr>
+      </p:pic>
+    </p:spTree>
+    <p:extLst>
+      <p:ext uri="{BB962C8B-B14F-4D97-AF65-F5344CB8AC3E}">
+        <p14:creationId xmlns:p14="http://schemas.microsoft.com/office/powerpoint/2010/main" val="302626204"/>
+      </p:ext>
+    </p:extLst>
+  </p:cSld>
+  <p:clrMapOvr>
+    <a:masterClrMapping/>
+  </p:clrMapOvr>
+</p:sld>
+</file>
+
+<file path=ppt/slides/slide25.xml><?xml version="1.0" encoding="utf-8"?>
+<p:sld xmlns:a="http://schemas.openxmlformats.org/drawingml/2006/main" xmlns:r="http://schemas.openxmlformats.org/officeDocument/2006/relationships" xmlns:p="http://schemas.openxmlformats.org/presentationml/2006/main">
+  <p:cSld>
+    <p:spTree>
+      <p:nvGrpSpPr>
+        <p:cNvPr id="1" name=""/>
+        <p:cNvGrpSpPr/>
+        <p:nvPr/>
+      </p:nvGrpSpPr>
+      <p:grpSpPr>
+        <a:xfrm>
+          <a:off x="0" y="0"/>
+          <a:ext cx="0" cy="0"/>
+          <a:chOff x="0" y="0"/>
+          <a:chExt cx="0" cy="0"/>
+        </a:xfrm>
+      </p:grpSpPr>
+      <p:sp>
+        <p:nvSpPr>
+          <p:cNvPr id="2" name="Title 1">
+            <a:extLst>
+              <a:ext uri="{FF2B5EF4-FFF2-40B4-BE49-F238E27FC236}">
+                <a16:creationId xmlns:a16="http://schemas.microsoft.com/office/drawing/2014/main" id="{D5A31E08-DFB8-8419-DA11-4FDD0BAD36A9}"/>
+              </a:ext>
+            </a:extLst>
+          </p:cNvPr>
+          <p:cNvSpPr>
+            <a:spLocks noGrp="1"/>
+          </p:cNvSpPr>
+          <p:nvPr>
+            <p:ph type="title"/>
+          </p:nvPr>
+        </p:nvSpPr>
+        <p:spPr>
+          <a:xfrm>
+            <a:off x="1824111" y="723900"/>
+            <a:ext cx="8543779" cy="446557"/>
+          </a:xfrm>
+        </p:spPr>
+        <p:txBody>
+          <a:bodyPr anchor="b">
+            <a:normAutofit fontScale="90000"/>
+          </a:bodyPr>
+          <a:lstStyle/>
+          <a:p>
+            <a:pPr algn="ctr"/>
+            <a:endParaRPr lang="en-IN" dirty="0"/>
+          </a:p>
+        </p:txBody>
+      </p:sp>
+      <p:pic>
+        <p:nvPicPr>
+          <p:cNvPr id="5" name="Picture 4">
+            <a:extLst>
+              <a:ext uri="{FF2B5EF4-FFF2-40B4-BE49-F238E27FC236}">
+                <a16:creationId xmlns:a16="http://schemas.microsoft.com/office/drawing/2014/main" id="{93111A8E-3E74-01C5-6D84-980D3BE12599}"/>
+              </a:ext>
+            </a:extLst>
+          </p:cNvPr>
+          <p:cNvPicPr>
+            <a:picLocks noChangeAspect="1"/>
+          </p:cNvPicPr>
+          <p:nvPr/>
+        </p:nvPicPr>
+        <p:blipFill>
+          <a:blip r:embed="rId2"/>
+          <a:stretch>
+            <a:fillRect/>
+          </a:stretch>
+        </p:blipFill>
+        <p:spPr>
+          <a:xfrm>
+            <a:off x="3527856" y="1334752"/>
+            <a:ext cx="5136288" cy="5126845"/>
+          </a:xfrm>
+          <a:prstGeom prst="rect">
+            <a:avLst/>
+          </a:prstGeom>
+        </p:spPr>
+      </p:pic>
+    </p:spTree>
+    <p:extLst>
+      <p:ext uri="{BB962C8B-B14F-4D97-AF65-F5344CB8AC3E}">
+        <p14:creationId xmlns:p14="http://schemas.microsoft.com/office/powerpoint/2010/main" val="643560932"/>
+      </p:ext>
+    </p:extLst>
+  </p:cSld>
+  <p:clrMapOvr>
+    <a:masterClrMapping/>
+  </p:clrMapOvr>
+</p:sld>
+</file>
+
+<file path=ppt/slides/slide26.xml><?xml version="1.0" encoding="utf-8"?>
+<p:sld xmlns:a="http://schemas.openxmlformats.org/drawingml/2006/main" xmlns:r="http://schemas.openxmlformats.org/officeDocument/2006/relationships" xmlns:p="http://schemas.openxmlformats.org/presentationml/2006/main">
+  <p:cSld>
+    <p:spTree>
+      <p:nvGrpSpPr>
+        <p:cNvPr id="1" name=""/>
+        <p:cNvGrpSpPr/>
+        <p:nvPr/>
+      </p:nvGrpSpPr>
+      <p:grpSpPr>
+        <a:xfrm>
+          <a:off x="0" y="0"/>
+          <a:ext cx="0" cy="0"/>
+          <a:chOff x="0" y="0"/>
+          <a:chExt cx="0" cy="0"/>
+        </a:xfrm>
+      </p:grpSpPr>
+      <p:sp>
+        <p:nvSpPr>
+          <p:cNvPr id="2" name="Title 1">
+            <a:extLst>
+              <a:ext uri="{FF2B5EF4-FFF2-40B4-BE49-F238E27FC236}">
+                <a16:creationId xmlns:a16="http://schemas.microsoft.com/office/drawing/2014/main" id="{D5A31E08-DFB8-8419-DA11-4FDD0BAD36A9}"/>
+              </a:ext>
+            </a:extLst>
+          </p:cNvPr>
+          <p:cNvSpPr>
+            <a:spLocks noGrp="1"/>
+          </p:cNvSpPr>
+          <p:nvPr>
+            <p:ph type="title"/>
+          </p:nvPr>
+        </p:nvSpPr>
+        <p:spPr>
+          <a:xfrm>
+            <a:off x="1824111" y="723900"/>
+            <a:ext cx="8543779" cy="446557"/>
+          </a:xfrm>
+        </p:spPr>
+        <p:txBody>
+          <a:bodyPr anchor="b">
+            <a:normAutofit fontScale="90000"/>
+          </a:bodyPr>
+          <a:lstStyle/>
+          <a:p>
+            <a:pPr algn="ctr"/>
+            <a:endParaRPr lang="en-IN" dirty="0"/>
+          </a:p>
+        </p:txBody>
+      </p:sp>
+      <p:pic>
+        <p:nvPicPr>
+          <p:cNvPr id="5" name="Picture 4">
+            <a:extLst>
+              <a:ext uri="{FF2B5EF4-FFF2-40B4-BE49-F238E27FC236}">
+                <a16:creationId xmlns:a16="http://schemas.microsoft.com/office/drawing/2014/main" id="{D26A8136-AF17-C761-5885-D079B47B885E}"/>
+              </a:ext>
+            </a:extLst>
+          </p:cNvPr>
+          <p:cNvPicPr>
+            <a:picLocks noChangeAspect="1"/>
+          </p:cNvPicPr>
+          <p:nvPr/>
+        </p:nvPicPr>
+        <p:blipFill>
+          <a:blip r:embed="rId2"/>
+          <a:stretch>
+            <a:fillRect/>
+          </a:stretch>
+        </p:blipFill>
+        <p:spPr>
+          <a:xfrm>
+            <a:off x="3658689" y="1448619"/>
+            <a:ext cx="5038997" cy="5011054"/>
+          </a:xfrm>
+          <a:prstGeom prst="rect">
+            <a:avLst/>
+          </a:prstGeom>
+        </p:spPr>
+      </p:pic>
+    </p:spTree>
+    <p:extLst>
+      <p:ext uri="{BB962C8B-B14F-4D97-AF65-F5344CB8AC3E}">
+        <p14:creationId xmlns:p14="http://schemas.microsoft.com/office/powerpoint/2010/main" val="3824740699"/>
+      </p:ext>
+    </p:extLst>
+  </p:cSld>
+  <p:clrMapOvr>
+    <a:masterClrMapping/>
+  </p:clrMapOvr>
+</p:sld>
+</file>
+
+<file path=ppt/slides/slide27.xml><?xml version="1.0" encoding="utf-8"?>
+<p:sld xmlns:a="http://schemas.openxmlformats.org/drawingml/2006/main" xmlns:r="http://schemas.openxmlformats.org/officeDocument/2006/relationships" xmlns:p="http://schemas.openxmlformats.org/presentationml/2006/main">
+  <p:cSld>
+    <p:spTree>
+      <p:nvGrpSpPr>
+        <p:cNvPr id="1" name=""/>
+        <p:cNvGrpSpPr/>
+        <p:nvPr/>
+      </p:nvGrpSpPr>
+      <p:grpSpPr>
+        <a:xfrm>
+          <a:off x="0" y="0"/>
+          <a:ext cx="0" cy="0"/>
+          <a:chOff x="0" y="0"/>
+          <a:chExt cx="0" cy="0"/>
+        </a:xfrm>
+      </p:grpSpPr>
+      <p:sp>
+        <p:nvSpPr>
+          <p:cNvPr id="2" name="Title 1">
+            <a:extLst>
+              <a:ext uri="{FF2B5EF4-FFF2-40B4-BE49-F238E27FC236}">
+                <a16:creationId xmlns:a16="http://schemas.microsoft.com/office/drawing/2014/main" id="{D5A31E08-DFB8-8419-DA11-4FDD0BAD36A9}"/>
+              </a:ext>
+            </a:extLst>
+          </p:cNvPr>
+          <p:cNvSpPr>
+            <a:spLocks noGrp="1"/>
+          </p:cNvSpPr>
+          <p:nvPr>
+            <p:ph type="title"/>
+          </p:nvPr>
+        </p:nvSpPr>
+        <p:spPr>
+          <a:xfrm>
+            <a:off x="1824111" y="723900"/>
+            <a:ext cx="8543779" cy="446557"/>
+          </a:xfrm>
+        </p:spPr>
+        <p:txBody>
+          <a:bodyPr anchor="b">
+            <a:normAutofit fontScale="90000"/>
+          </a:bodyPr>
+          <a:lstStyle/>
+          <a:p>
+            <a:pPr algn="ctr"/>
+            <a:endParaRPr lang="en-IN" dirty="0"/>
+          </a:p>
+        </p:txBody>
+      </p:sp>
+      <p:pic>
+        <p:nvPicPr>
+          <p:cNvPr id="5" name="Picture 4">
+            <a:extLst>
+              <a:ext uri="{FF2B5EF4-FFF2-40B4-BE49-F238E27FC236}">
+                <a16:creationId xmlns:a16="http://schemas.microsoft.com/office/drawing/2014/main" id="{C460E342-618F-8965-AE02-CA1DEA43011D}"/>
+              </a:ext>
+            </a:extLst>
+          </p:cNvPr>
+          <p:cNvPicPr>
+            <a:picLocks noChangeAspect="1"/>
+          </p:cNvPicPr>
+          <p:nvPr/>
+        </p:nvPicPr>
+        <p:blipFill>
+          <a:blip r:embed="rId2"/>
+          <a:stretch>
+            <a:fillRect/>
+          </a:stretch>
+        </p:blipFill>
+        <p:spPr>
+          <a:xfrm>
+            <a:off x="2020581" y="1433645"/>
+            <a:ext cx="8150837" cy="4868564"/>
+          </a:xfrm>
+          <a:prstGeom prst="rect">
+            <a:avLst/>
+          </a:prstGeom>
+        </p:spPr>
+      </p:pic>
+    </p:spTree>
+    <p:extLst>
+      <p:ext uri="{BB962C8B-B14F-4D97-AF65-F5344CB8AC3E}">
+        <p14:creationId xmlns:p14="http://schemas.microsoft.com/office/powerpoint/2010/main" val="849080322"/>
       </p:ext>
     </p:extLst>
   </p:cSld>
@@ -4614,7 +6733,7 @@
           <p:cNvPr id="2" name="Title 1">
             <a:extLst>
               <a:ext uri="{FF2B5EF4-FFF2-40B4-BE49-F238E27FC236}">
-                <a16:creationId xmlns:a16="http://schemas.microsoft.com/office/drawing/2014/main" id="{1B1D9CE0-54C2-0713-B395-BFCDD945F464}"/>
+                <a16:creationId xmlns:a16="http://schemas.microsoft.com/office/drawing/2014/main" id="{D5A31E08-DFB8-8419-DA11-4FDD0BAD36A9}"/>
               </a:ext>
             </a:extLst>
           </p:cNvPr>
@@ -4625,44 +6744,57 @@
             <p:ph type="title"/>
           </p:nvPr>
         </p:nvSpPr>
-        <p:spPr/>
-        <p:txBody>
-          <a:bodyPr/>
-          <a:lstStyle/>
-          <a:p>
-            <a:endParaRPr lang="en-IN"/>
-          </a:p>
-        </p:txBody>
-      </p:sp>
-      <p:sp>
-        <p:nvSpPr>
-          <p:cNvPr id="3" name="Content Placeholder 2">
-            <a:extLst>
-              <a:ext uri="{FF2B5EF4-FFF2-40B4-BE49-F238E27FC236}">
-                <a16:creationId xmlns:a16="http://schemas.microsoft.com/office/drawing/2014/main" id="{F419F2DC-6868-5E30-0BA7-CB1498E849A5}"/>
-              </a:ext>
-            </a:extLst>
-          </p:cNvPr>
-          <p:cNvSpPr>
-            <a:spLocks noGrp="1"/>
-          </p:cNvSpPr>
-          <p:nvPr>
-            <p:ph idx="1"/>
-          </p:nvPr>
-        </p:nvSpPr>
-        <p:spPr/>
-        <p:txBody>
-          <a:bodyPr/>
-          <a:lstStyle/>
-          <a:p>
-            <a:endParaRPr lang="en-IN"/>
-          </a:p>
-        </p:txBody>
-      </p:sp>
+        <p:spPr>
+          <a:xfrm>
+            <a:off x="1824111" y="723900"/>
+            <a:ext cx="8543779" cy="446557"/>
+          </a:xfrm>
+        </p:spPr>
+        <p:txBody>
+          <a:bodyPr anchor="b">
+            <a:normAutofit fontScale="90000"/>
+          </a:bodyPr>
+          <a:lstStyle/>
+          <a:p>
+            <a:pPr algn="ctr"/>
+            <a:endParaRPr lang="en-IN" dirty="0"/>
+          </a:p>
+        </p:txBody>
+      </p:sp>
+      <p:pic>
+        <p:nvPicPr>
+          <p:cNvPr id="4" name="Picture 3">
+            <a:extLst>
+              <a:ext uri="{FF2B5EF4-FFF2-40B4-BE49-F238E27FC236}">
+                <a16:creationId xmlns:a16="http://schemas.microsoft.com/office/drawing/2014/main" id="{449C68D6-BCAB-1013-20A1-FDDDEA33A5AC}"/>
+              </a:ext>
+            </a:extLst>
+          </p:cNvPr>
+          <p:cNvPicPr>
+            <a:picLocks noChangeAspect="1"/>
+          </p:cNvPicPr>
+          <p:nvPr/>
+        </p:nvPicPr>
+        <p:blipFill>
+          <a:blip r:embed="rId2"/>
+          <a:stretch>
+            <a:fillRect/>
+          </a:stretch>
+        </p:blipFill>
+        <p:spPr>
+          <a:xfrm>
+            <a:off x="1637511" y="1787440"/>
+            <a:ext cx="8916978" cy="3851360"/>
+          </a:xfrm>
+          <a:prstGeom prst="rect">
+            <a:avLst/>
+          </a:prstGeom>
+        </p:spPr>
+      </p:pic>
     </p:spTree>
     <p:extLst>
       <p:ext uri="{BB962C8B-B14F-4D97-AF65-F5344CB8AC3E}">
-        <p14:creationId xmlns:p14="http://schemas.microsoft.com/office/powerpoint/2010/main" val="3297471068"/>
+        <p14:creationId xmlns:p14="http://schemas.microsoft.com/office/powerpoint/2010/main" val="3521082934"/>
       </p:ext>
     </p:extLst>
   </p:cSld>
@@ -4694,7 +6826,7 @@
           <p:cNvPr id="2" name="Title 1">
             <a:extLst>
               <a:ext uri="{FF2B5EF4-FFF2-40B4-BE49-F238E27FC236}">
-                <a16:creationId xmlns:a16="http://schemas.microsoft.com/office/drawing/2014/main" id="{64236629-E3A5-3AAB-8B62-F1AFD6509952}"/>
+                <a16:creationId xmlns:a16="http://schemas.microsoft.com/office/drawing/2014/main" id="{D5A31E08-DFB8-8419-DA11-4FDD0BAD36A9}"/>
               </a:ext>
             </a:extLst>
           </p:cNvPr>
@@ -4705,44 +6837,522 @@
             <p:ph type="title"/>
           </p:nvPr>
         </p:nvSpPr>
-        <p:spPr/>
-        <p:txBody>
-          <a:bodyPr/>
-          <a:lstStyle/>
-          <a:p>
-            <a:endParaRPr lang="en-IN"/>
-          </a:p>
-        </p:txBody>
-      </p:sp>
-      <p:sp>
-        <p:nvSpPr>
-          <p:cNvPr id="3" name="Content Placeholder 2">
-            <a:extLst>
-              <a:ext uri="{FF2B5EF4-FFF2-40B4-BE49-F238E27FC236}">
-                <a16:creationId xmlns:a16="http://schemas.microsoft.com/office/drawing/2014/main" id="{17032A50-018D-1CA0-80E6-E31192FCCE25}"/>
-              </a:ext>
-            </a:extLst>
-          </p:cNvPr>
-          <p:cNvSpPr>
-            <a:spLocks noGrp="1"/>
-          </p:cNvSpPr>
-          <p:nvPr>
-            <p:ph idx="1"/>
-          </p:nvPr>
-        </p:nvSpPr>
-        <p:spPr/>
-        <p:txBody>
-          <a:bodyPr/>
-          <a:lstStyle/>
-          <a:p>
-            <a:endParaRPr lang="en-IN"/>
-          </a:p>
-        </p:txBody>
-      </p:sp>
+        <p:spPr>
+          <a:xfrm>
+            <a:off x="1824111" y="723900"/>
+            <a:ext cx="8543779" cy="446557"/>
+          </a:xfrm>
+        </p:spPr>
+        <p:txBody>
+          <a:bodyPr anchor="b">
+            <a:normAutofit fontScale="90000"/>
+          </a:bodyPr>
+          <a:lstStyle/>
+          <a:p>
+            <a:pPr algn="ctr"/>
+            <a:endParaRPr lang="en-IN" dirty="0"/>
+          </a:p>
+        </p:txBody>
+      </p:sp>
+      <p:pic>
+        <p:nvPicPr>
+          <p:cNvPr id="4" name="Picture 3">
+            <a:extLst>
+              <a:ext uri="{FF2B5EF4-FFF2-40B4-BE49-F238E27FC236}">
+                <a16:creationId xmlns:a16="http://schemas.microsoft.com/office/drawing/2014/main" id="{13F29E5D-C475-CEC2-764E-2479034A4AEC}"/>
+              </a:ext>
+            </a:extLst>
+          </p:cNvPr>
+          <p:cNvPicPr>
+            <a:picLocks noChangeAspect="1"/>
+          </p:cNvPicPr>
+          <p:nvPr/>
+        </p:nvPicPr>
+        <p:blipFill>
+          <a:blip r:embed="rId2"/>
+          <a:stretch>
+            <a:fillRect/>
+          </a:stretch>
+        </p:blipFill>
+        <p:spPr>
+          <a:xfrm>
+            <a:off x="3135590" y="1750725"/>
+            <a:ext cx="5920819" cy="3855418"/>
+          </a:xfrm>
+          <a:prstGeom prst="rect">
+            <a:avLst/>
+          </a:prstGeom>
+        </p:spPr>
+      </p:pic>
     </p:spTree>
     <p:extLst>
       <p:ext uri="{BB962C8B-B14F-4D97-AF65-F5344CB8AC3E}">
-        <p14:creationId xmlns:p14="http://schemas.microsoft.com/office/powerpoint/2010/main" val="2035375407"/>
+        <p14:creationId xmlns:p14="http://schemas.microsoft.com/office/powerpoint/2010/main" val="723461575"/>
+      </p:ext>
+    </p:extLst>
+  </p:cSld>
+  <p:clrMapOvr>
+    <a:masterClrMapping/>
+  </p:clrMapOvr>
+</p:sld>
+</file>
+
+<file path=ppt/slides/slide5.xml><?xml version="1.0" encoding="utf-8"?>
+<p:sld xmlns:a="http://schemas.openxmlformats.org/drawingml/2006/main" xmlns:r="http://schemas.openxmlformats.org/officeDocument/2006/relationships" xmlns:p="http://schemas.openxmlformats.org/presentationml/2006/main">
+  <p:cSld>
+    <p:spTree>
+      <p:nvGrpSpPr>
+        <p:cNvPr id="1" name=""/>
+        <p:cNvGrpSpPr/>
+        <p:nvPr/>
+      </p:nvGrpSpPr>
+      <p:grpSpPr>
+        <a:xfrm>
+          <a:off x="0" y="0"/>
+          <a:ext cx="0" cy="0"/>
+          <a:chOff x="0" y="0"/>
+          <a:chExt cx="0" cy="0"/>
+        </a:xfrm>
+      </p:grpSpPr>
+      <p:sp>
+        <p:nvSpPr>
+          <p:cNvPr id="2" name="Title 1">
+            <a:extLst>
+              <a:ext uri="{FF2B5EF4-FFF2-40B4-BE49-F238E27FC236}">
+                <a16:creationId xmlns:a16="http://schemas.microsoft.com/office/drawing/2014/main" id="{D5A31E08-DFB8-8419-DA11-4FDD0BAD36A9}"/>
+              </a:ext>
+            </a:extLst>
+          </p:cNvPr>
+          <p:cNvSpPr>
+            <a:spLocks noGrp="1"/>
+          </p:cNvSpPr>
+          <p:nvPr>
+            <p:ph type="title"/>
+          </p:nvPr>
+        </p:nvSpPr>
+        <p:spPr>
+          <a:xfrm>
+            <a:off x="1824111" y="723900"/>
+            <a:ext cx="8543779" cy="446557"/>
+          </a:xfrm>
+        </p:spPr>
+        <p:txBody>
+          <a:bodyPr anchor="b">
+            <a:normAutofit fontScale="90000"/>
+          </a:bodyPr>
+          <a:lstStyle/>
+          <a:p>
+            <a:pPr algn="ctr"/>
+            <a:endParaRPr lang="en-IN" dirty="0"/>
+          </a:p>
+        </p:txBody>
+      </p:sp>
+      <p:pic>
+        <p:nvPicPr>
+          <p:cNvPr id="4" name="Picture 3">
+            <a:extLst>
+              <a:ext uri="{FF2B5EF4-FFF2-40B4-BE49-F238E27FC236}">
+                <a16:creationId xmlns:a16="http://schemas.microsoft.com/office/drawing/2014/main" id="{38A695FB-0391-ADB8-8DEF-CD0006000E2E}"/>
+              </a:ext>
+            </a:extLst>
+          </p:cNvPr>
+          <p:cNvPicPr>
+            <a:picLocks noChangeAspect="1"/>
+          </p:cNvPicPr>
+          <p:nvPr/>
+        </p:nvPicPr>
+        <p:blipFill>
+          <a:blip r:embed="rId2"/>
+          <a:stretch>
+            <a:fillRect/>
+          </a:stretch>
+        </p:blipFill>
+        <p:spPr>
+          <a:xfrm>
+            <a:off x="3153411" y="1726234"/>
+            <a:ext cx="5885177" cy="3923452"/>
+          </a:xfrm>
+          <a:prstGeom prst="rect">
+            <a:avLst/>
+          </a:prstGeom>
+        </p:spPr>
+      </p:pic>
+    </p:spTree>
+    <p:extLst>
+      <p:ext uri="{BB962C8B-B14F-4D97-AF65-F5344CB8AC3E}">
+        <p14:creationId xmlns:p14="http://schemas.microsoft.com/office/powerpoint/2010/main" val="986197321"/>
+      </p:ext>
+    </p:extLst>
+  </p:cSld>
+  <p:clrMapOvr>
+    <a:masterClrMapping/>
+  </p:clrMapOvr>
+</p:sld>
+</file>
+
+<file path=ppt/slides/slide6.xml><?xml version="1.0" encoding="utf-8"?>
+<p:sld xmlns:a="http://schemas.openxmlformats.org/drawingml/2006/main" xmlns:r="http://schemas.openxmlformats.org/officeDocument/2006/relationships" xmlns:p="http://schemas.openxmlformats.org/presentationml/2006/main">
+  <p:cSld>
+    <p:spTree>
+      <p:nvGrpSpPr>
+        <p:cNvPr id="1" name=""/>
+        <p:cNvGrpSpPr/>
+        <p:nvPr/>
+      </p:nvGrpSpPr>
+      <p:grpSpPr>
+        <a:xfrm>
+          <a:off x="0" y="0"/>
+          <a:ext cx="0" cy="0"/>
+          <a:chOff x="0" y="0"/>
+          <a:chExt cx="0" cy="0"/>
+        </a:xfrm>
+      </p:grpSpPr>
+      <p:sp>
+        <p:nvSpPr>
+          <p:cNvPr id="2" name="Title 1">
+            <a:extLst>
+              <a:ext uri="{FF2B5EF4-FFF2-40B4-BE49-F238E27FC236}">
+                <a16:creationId xmlns:a16="http://schemas.microsoft.com/office/drawing/2014/main" id="{D5A31E08-DFB8-8419-DA11-4FDD0BAD36A9}"/>
+              </a:ext>
+            </a:extLst>
+          </p:cNvPr>
+          <p:cNvSpPr>
+            <a:spLocks noGrp="1"/>
+          </p:cNvSpPr>
+          <p:nvPr>
+            <p:ph type="title"/>
+          </p:nvPr>
+        </p:nvSpPr>
+        <p:spPr>
+          <a:xfrm>
+            <a:off x="1824111" y="723900"/>
+            <a:ext cx="8543779" cy="446557"/>
+          </a:xfrm>
+        </p:spPr>
+        <p:txBody>
+          <a:bodyPr anchor="b">
+            <a:normAutofit fontScale="90000"/>
+          </a:bodyPr>
+          <a:lstStyle/>
+          <a:p>
+            <a:pPr algn="ctr"/>
+            <a:endParaRPr lang="en-IN" dirty="0"/>
+          </a:p>
+        </p:txBody>
+      </p:sp>
+      <p:pic>
+        <p:nvPicPr>
+          <p:cNvPr id="4" name="Picture 3">
+            <a:extLst>
+              <a:ext uri="{FF2B5EF4-FFF2-40B4-BE49-F238E27FC236}">
+                <a16:creationId xmlns:a16="http://schemas.microsoft.com/office/drawing/2014/main" id="{970862BB-CF52-CEAD-37BE-80CCFBE7E21F}"/>
+              </a:ext>
+            </a:extLst>
+          </p:cNvPr>
+          <p:cNvPicPr>
+            <a:picLocks noChangeAspect="1"/>
+          </p:cNvPicPr>
+          <p:nvPr/>
+        </p:nvPicPr>
+        <p:blipFill>
+          <a:blip r:embed="rId2"/>
+          <a:stretch>
+            <a:fillRect/>
+          </a:stretch>
+        </p:blipFill>
+        <p:spPr>
+          <a:xfrm>
+            <a:off x="3738515" y="1435589"/>
+            <a:ext cx="4714969" cy="4698511"/>
+          </a:xfrm>
+          <a:prstGeom prst="rect">
+            <a:avLst/>
+          </a:prstGeom>
+        </p:spPr>
+      </p:pic>
+    </p:spTree>
+    <p:extLst>
+      <p:ext uri="{BB962C8B-B14F-4D97-AF65-F5344CB8AC3E}">
+        <p14:creationId xmlns:p14="http://schemas.microsoft.com/office/powerpoint/2010/main" val="1297443004"/>
+      </p:ext>
+    </p:extLst>
+  </p:cSld>
+  <p:clrMapOvr>
+    <a:masterClrMapping/>
+  </p:clrMapOvr>
+</p:sld>
+</file>
+
+<file path=ppt/slides/slide7.xml><?xml version="1.0" encoding="utf-8"?>
+<p:sld xmlns:a="http://schemas.openxmlformats.org/drawingml/2006/main" xmlns:r="http://schemas.openxmlformats.org/officeDocument/2006/relationships" xmlns:p="http://schemas.openxmlformats.org/presentationml/2006/main">
+  <p:cSld>
+    <p:spTree>
+      <p:nvGrpSpPr>
+        <p:cNvPr id="1" name=""/>
+        <p:cNvGrpSpPr/>
+        <p:nvPr/>
+      </p:nvGrpSpPr>
+      <p:grpSpPr>
+        <a:xfrm>
+          <a:off x="0" y="0"/>
+          <a:ext cx="0" cy="0"/>
+          <a:chOff x="0" y="0"/>
+          <a:chExt cx="0" cy="0"/>
+        </a:xfrm>
+      </p:grpSpPr>
+      <p:sp>
+        <p:nvSpPr>
+          <p:cNvPr id="2" name="Title 1">
+            <a:extLst>
+              <a:ext uri="{FF2B5EF4-FFF2-40B4-BE49-F238E27FC236}">
+                <a16:creationId xmlns:a16="http://schemas.microsoft.com/office/drawing/2014/main" id="{D5A31E08-DFB8-8419-DA11-4FDD0BAD36A9}"/>
+              </a:ext>
+            </a:extLst>
+          </p:cNvPr>
+          <p:cNvSpPr>
+            <a:spLocks noGrp="1"/>
+          </p:cNvSpPr>
+          <p:nvPr>
+            <p:ph type="title"/>
+          </p:nvPr>
+        </p:nvSpPr>
+        <p:spPr>
+          <a:xfrm>
+            <a:off x="1824111" y="723900"/>
+            <a:ext cx="8543779" cy="446557"/>
+          </a:xfrm>
+        </p:spPr>
+        <p:txBody>
+          <a:bodyPr anchor="b">
+            <a:normAutofit fontScale="90000"/>
+          </a:bodyPr>
+          <a:lstStyle/>
+          <a:p>
+            <a:pPr algn="ctr"/>
+            <a:endParaRPr lang="en-IN" dirty="0"/>
+          </a:p>
+        </p:txBody>
+      </p:sp>
+      <p:pic>
+        <p:nvPicPr>
+          <p:cNvPr id="5" name="Picture 4">
+            <a:extLst>
+              <a:ext uri="{FF2B5EF4-FFF2-40B4-BE49-F238E27FC236}">
+                <a16:creationId xmlns:a16="http://schemas.microsoft.com/office/drawing/2014/main" id="{E5E8F87F-1F16-4094-CA71-516DB2DF769D}"/>
+              </a:ext>
+            </a:extLst>
+          </p:cNvPr>
+          <p:cNvPicPr>
+            <a:picLocks noChangeAspect="1"/>
+          </p:cNvPicPr>
+          <p:nvPr/>
+        </p:nvPicPr>
+        <p:blipFill>
+          <a:blip r:embed="rId2"/>
+          <a:stretch>
+            <a:fillRect/>
+          </a:stretch>
+        </p:blipFill>
+        <p:spPr>
+          <a:xfrm>
+            <a:off x="3000508" y="1638249"/>
+            <a:ext cx="6190984" cy="4011437"/>
+          </a:xfrm>
+          <a:prstGeom prst="rect">
+            <a:avLst/>
+          </a:prstGeom>
+        </p:spPr>
+      </p:pic>
+    </p:spTree>
+    <p:extLst>
+      <p:ext uri="{BB962C8B-B14F-4D97-AF65-F5344CB8AC3E}">
+        <p14:creationId xmlns:p14="http://schemas.microsoft.com/office/powerpoint/2010/main" val="583719506"/>
+      </p:ext>
+    </p:extLst>
+  </p:cSld>
+  <p:clrMapOvr>
+    <a:masterClrMapping/>
+  </p:clrMapOvr>
+</p:sld>
+</file>
+
+<file path=ppt/slides/slide8.xml><?xml version="1.0" encoding="utf-8"?>
+<p:sld xmlns:a="http://schemas.openxmlformats.org/drawingml/2006/main" xmlns:r="http://schemas.openxmlformats.org/officeDocument/2006/relationships" xmlns:p="http://schemas.openxmlformats.org/presentationml/2006/main">
+  <p:cSld>
+    <p:spTree>
+      <p:nvGrpSpPr>
+        <p:cNvPr id="1" name=""/>
+        <p:cNvGrpSpPr/>
+        <p:nvPr/>
+      </p:nvGrpSpPr>
+      <p:grpSpPr>
+        <a:xfrm>
+          <a:off x="0" y="0"/>
+          <a:ext cx="0" cy="0"/>
+          <a:chOff x="0" y="0"/>
+          <a:chExt cx="0" cy="0"/>
+        </a:xfrm>
+      </p:grpSpPr>
+      <p:sp>
+        <p:nvSpPr>
+          <p:cNvPr id="2" name="Title 1">
+            <a:extLst>
+              <a:ext uri="{FF2B5EF4-FFF2-40B4-BE49-F238E27FC236}">
+                <a16:creationId xmlns:a16="http://schemas.microsoft.com/office/drawing/2014/main" id="{D5A31E08-DFB8-8419-DA11-4FDD0BAD36A9}"/>
+              </a:ext>
+            </a:extLst>
+          </p:cNvPr>
+          <p:cNvSpPr>
+            <a:spLocks noGrp="1"/>
+          </p:cNvSpPr>
+          <p:nvPr>
+            <p:ph type="title"/>
+          </p:nvPr>
+        </p:nvSpPr>
+        <p:spPr>
+          <a:xfrm>
+            <a:off x="1824111" y="723900"/>
+            <a:ext cx="8543779" cy="446557"/>
+          </a:xfrm>
+        </p:spPr>
+        <p:txBody>
+          <a:bodyPr anchor="b">
+            <a:normAutofit fontScale="90000"/>
+          </a:bodyPr>
+          <a:lstStyle/>
+          <a:p>
+            <a:pPr algn="ctr"/>
+            <a:endParaRPr lang="en-IN" dirty="0"/>
+          </a:p>
+        </p:txBody>
+      </p:sp>
+      <p:pic>
+        <p:nvPicPr>
+          <p:cNvPr id="5" name="Picture 4">
+            <a:extLst>
+              <a:ext uri="{FF2B5EF4-FFF2-40B4-BE49-F238E27FC236}">
+                <a16:creationId xmlns:a16="http://schemas.microsoft.com/office/drawing/2014/main" id="{CD157CD5-7759-3D51-DEA5-348E157403AC}"/>
+              </a:ext>
+            </a:extLst>
+          </p:cNvPr>
+          <p:cNvPicPr>
+            <a:picLocks noChangeAspect="1"/>
+          </p:cNvPicPr>
+          <p:nvPr/>
+        </p:nvPicPr>
+        <p:blipFill>
+          <a:blip r:embed="rId2"/>
+          <a:stretch>
+            <a:fillRect/>
+          </a:stretch>
+        </p:blipFill>
+        <p:spPr>
+          <a:xfrm>
+            <a:off x="3033527" y="1595586"/>
+            <a:ext cx="6124945" cy="4206500"/>
+          </a:xfrm>
+          <a:prstGeom prst="rect">
+            <a:avLst/>
+          </a:prstGeom>
+        </p:spPr>
+      </p:pic>
+    </p:spTree>
+    <p:extLst>
+      <p:ext uri="{BB962C8B-B14F-4D97-AF65-F5344CB8AC3E}">
+        <p14:creationId xmlns:p14="http://schemas.microsoft.com/office/powerpoint/2010/main" val="2134828120"/>
+      </p:ext>
+    </p:extLst>
+  </p:cSld>
+  <p:clrMapOvr>
+    <a:masterClrMapping/>
+  </p:clrMapOvr>
+</p:sld>
+</file>
+
+<file path=ppt/slides/slide9.xml><?xml version="1.0" encoding="utf-8"?>
+<p:sld xmlns:a="http://schemas.openxmlformats.org/drawingml/2006/main" xmlns:r="http://schemas.openxmlformats.org/officeDocument/2006/relationships" xmlns:p="http://schemas.openxmlformats.org/presentationml/2006/main">
+  <p:cSld>
+    <p:spTree>
+      <p:nvGrpSpPr>
+        <p:cNvPr id="1" name=""/>
+        <p:cNvGrpSpPr/>
+        <p:nvPr/>
+      </p:nvGrpSpPr>
+      <p:grpSpPr>
+        <a:xfrm>
+          <a:off x="0" y="0"/>
+          <a:ext cx="0" cy="0"/>
+          <a:chOff x="0" y="0"/>
+          <a:chExt cx="0" cy="0"/>
+        </a:xfrm>
+      </p:grpSpPr>
+      <p:sp>
+        <p:nvSpPr>
+          <p:cNvPr id="2" name="Title 1">
+            <a:extLst>
+              <a:ext uri="{FF2B5EF4-FFF2-40B4-BE49-F238E27FC236}">
+                <a16:creationId xmlns:a16="http://schemas.microsoft.com/office/drawing/2014/main" id="{D5A31E08-DFB8-8419-DA11-4FDD0BAD36A9}"/>
+              </a:ext>
+            </a:extLst>
+          </p:cNvPr>
+          <p:cNvSpPr>
+            <a:spLocks noGrp="1"/>
+          </p:cNvSpPr>
+          <p:nvPr>
+            <p:ph type="title"/>
+          </p:nvPr>
+        </p:nvSpPr>
+        <p:spPr>
+          <a:xfrm>
+            <a:off x="1824111" y="723900"/>
+            <a:ext cx="8543779" cy="446557"/>
+          </a:xfrm>
+        </p:spPr>
+        <p:txBody>
+          <a:bodyPr anchor="b">
+            <a:normAutofit fontScale="90000"/>
+          </a:bodyPr>
+          <a:lstStyle/>
+          <a:p>
+            <a:pPr algn="ctr"/>
+            <a:endParaRPr lang="en-IN" dirty="0"/>
+          </a:p>
+        </p:txBody>
+      </p:sp>
+      <p:pic>
+        <p:nvPicPr>
+          <p:cNvPr id="5" name="Picture 4">
+            <a:extLst>
+              <a:ext uri="{FF2B5EF4-FFF2-40B4-BE49-F238E27FC236}">
+                <a16:creationId xmlns:a16="http://schemas.microsoft.com/office/drawing/2014/main" id="{C7EA7238-09B6-8530-3011-702CB9626C64}"/>
+              </a:ext>
+            </a:extLst>
+          </p:cNvPr>
+          <p:cNvPicPr>
+            <a:picLocks noChangeAspect="1"/>
+          </p:cNvPicPr>
+          <p:nvPr/>
+        </p:nvPicPr>
+        <p:blipFill>
+          <a:blip r:embed="rId2"/>
+          <a:stretch>
+            <a:fillRect/>
+          </a:stretch>
+        </p:blipFill>
+        <p:spPr>
+          <a:xfrm>
+            <a:off x="3548744" y="1295282"/>
+            <a:ext cx="4938598" cy="5168300"/>
+          </a:xfrm>
+          <a:prstGeom prst="rect">
+            <a:avLst/>
+          </a:prstGeom>
+        </p:spPr>
+      </p:pic>
+    </p:spTree>
+    <p:extLst>
+      <p:ext uri="{BB962C8B-B14F-4D97-AF65-F5344CB8AC3E}">
+        <p14:creationId xmlns:p14="http://schemas.microsoft.com/office/powerpoint/2010/main" val="3271254298"/>
       </p:ext>
     </p:extLst>
   </p:cSld>

</xml_diff>